<commit_message>
Slides 8 & 9 edits
</commit_message>
<xml_diff>
--- a/slides-steve/Chapter 08.pptx
+++ b/slides-steve/Chapter 08.pptx
@@ -5,10 +5,10 @@
     <p:sldMasterId id="2147483660" r:id="rId1"/>
   </p:sldMasterIdLst>
   <p:notesMasterIdLst>
-    <p:notesMasterId r:id="rId65"/>
+    <p:notesMasterId r:id="rId66"/>
   </p:notesMasterIdLst>
   <p:handoutMasterIdLst>
-    <p:handoutMasterId r:id="rId66"/>
+    <p:handoutMasterId r:id="rId67"/>
   </p:handoutMasterIdLst>
   <p:sldIdLst>
     <p:sldId id="256" r:id="rId2"/>
@@ -62,18 +62,19 @@
     <p:sldId id="286" r:id="rId50"/>
     <p:sldId id="287" r:id="rId51"/>
     <p:sldId id="288" r:id="rId52"/>
-    <p:sldId id="289" r:id="rId53"/>
-    <p:sldId id="290" r:id="rId54"/>
-    <p:sldId id="291" r:id="rId55"/>
-    <p:sldId id="292" r:id="rId56"/>
-    <p:sldId id="293" r:id="rId57"/>
-    <p:sldId id="294" r:id="rId58"/>
-    <p:sldId id="295" r:id="rId59"/>
-    <p:sldId id="296" r:id="rId60"/>
-    <p:sldId id="297" r:id="rId61"/>
-    <p:sldId id="298" r:id="rId62"/>
-    <p:sldId id="299" r:id="rId63"/>
-    <p:sldId id="318" r:id="rId64"/>
+    <p:sldId id="319" r:id="rId53"/>
+    <p:sldId id="289" r:id="rId54"/>
+    <p:sldId id="290" r:id="rId55"/>
+    <p:sldId id="291" r:id="rId56"/>
+    <p:sldId id="292" r:id="rId57"/>
+    <p:sldId id="293" r:id="rId58"/>
+    <p:sldId id="294" r:id="rId59"/>
+    <p:sldId id="295" r:id="rId60"/>
+    <p:sldId id="296" r:id="rId61"/>
+    <p:sldId id="297" r:id="rId62"/>
+    <p:sldId id="298" r:id="rId63"/>
+    <p:sldId id="299" r:id="rId64"/>
+    <p:sldId id="318" r:id="rId65"/>
   </p:sldIdLst>
   <p:sldSz cx="9144000" cy="6858000" type="screen4x3"/>
   <p:notesSz cx="6858000" cy="9144000"/>
@@ -172,6 +173,22 @@
       </a:defRPr>
     </a:lvl9pPr>
   </p:defaultTextStyle>
+  <p:extLst>
+    <p:ext uri="{EFAFB233-063F-42B5-8137-9DF3F51BA10A}">
+      <p15:sldGuideLst xmlns:p15="http://schemas.microsoft.com/office/powerpoint/2012/main">
+        <p15:guide id="1" orient="horz" pos="2160">
+          <p15:clr>
+            <a:srgbClr val="A4A3A4"/>
+          </p15:clr>
+        </p15:guide>
+        <p15:guide id="2" pos="2880">
+          <p15:clr>
+            <a:srgbClr val="A4A3A4"/>
+          </p15:clr>
+        </p15:guide>
+      </p15:sldGuideLst>
+    </p:ext>
+  </p:extLst>
 </p:presentation>
 </file>
 
@@ -257,7 +274,7 @@
           <a:p>
             <a:fld id="{ADA41F73-5C6D-5847-B36A-32A10D887DF5}" type="datetimeFigureOut">
               <a:rPr lang="en-US" smtClean="0"/>
-              <a:t>9/16/15</a:t>
+              <a:t>9/25/16</a:t>
             </a:fld>
             <a:endParaRPr lang="en-US"/>
           </a:p>
@@ -423,7 +440,7 @@
           <a:p>
             <a:fld id="{CDD03CD3-8FE4-2544-A589-D7EB1A72ED32}" type="datetimeFigureOut">
               <a:rPr lang="en-US" smtClean="0"/>
-              <a:t>9/15/15</a:t>
+              <a:t>9/25/16</a:t>
             </a:fld>
             <a:endParaRPr lang="en-US"/>
           </a:p>
@@ -1761,7 +1778,7 @@
           <a:p>
             <a:fld id="{917F1E21-2D58-744F-BB16-49ADF20D8AC4}" type="datetime1">
               <a:rPr lang="en-US" smtClean="0"/>
-              <a:t>9/16/15</a:t>
+              <a:t>9/25/16</a:t>
             </a:fld>
             <a:endParaRPr lang="en-US"/>
           </a:p>
@@ -2053,7 +2070,7 @@
           <a:p>
             <a:fld id="{C5DAF1FD-2834-B645-BAF3-7F43B71D25D5}" type="datetime1">
               <a:rPr lang="en-US" smtClean="0"/>
-              <a:t>9/16/15</a:t>
+              <a:t>9/25/16</a:t>
             </a:fld>
             <a:endParaRPr lang="en-US"/>
           </a:p>
@@ -2175,7 +2192,7 @@
           <a:p>
             <a:fld id="{0C5A50F6-865D-3F44-B541-5207A2B3037C}" type="datetime1">
               <a:rPr lang="en-US" smtClean="0"/>
-              <a:t>9/16/15</a:t>
+              <a:t>9/25/16</a:t>
             </a:fld>
             <a:endParaRPr lang="en-US"/>
           </a:p>
@@ -2274,7 +2291,7 @@
           <a:p>
             <a:fld id="{092368DB-568E-964C-9146-607DB49E4153}" type="datetime1">
               <a:rPr lang="en-US" smtClean="0"/>
-              <a:t>9/16/15</a:t>
+              <a:t>9/25/16</a:t>
             </a:fld>
             <a:endParaRPr lang="en-US"/>
           </a:p>
@@ -2520,7 +2537,7 @@
           <a:p>
             <a:fld id="{292B64D0-0A50-0B44-A3A6-332C9D81962A}" type="datetime1">
               <a:rPr lang="en-US" smtClean="0"/>
-              <a:t>9/16/15</a:t>
+              <a:t>9/25/16</a:t>
             </a:fld>
             <a:endParaRPr lang="en-US"/>
           </a:p>
@@ -2766,7 +2783,7 @@
           <a:p>
             <a:fld id="{DCE8F31B-7E22-4A46-8E56-5F300374207A}" type="datetime1">
               <a:rPr lang="en-US" smtClean="0"/>
-              <a:t>9/16/15</a:t>
+              <a:t>9/25/16</a:t>
             </a:fld>
             <a:endParaRPr lang="en-US"/>
           </a:p>
@@ -3158,7 +3175,11 @@
           <a:p>
             <a:r>
               <a:rPr lang="en-US" dirty="0" smtClean="0"/>
-              <a:t>Chapter Eight</a:t>
+              <a:t>Chapter </a:t>
+            </a:r>
+            <a:r>
+              <a:rPr lang="en-US" dirty="0" smtClean="0"/>
+              <a:t>8</a:t>
             </a:r>
             <a:endParaRPr lang="en-US" dirty="0"/>
           </a:p>
@@ -3199,13 +3220,13 @@
   <p:clrMapOvr>
     <a:masterClrMapping/>
   </p:clrMapOvr>
-  <mc:AlternateContent xmlns:mc="http://schemas.openxmlformats.org/markup-compatibility/2006">
-    <mc:Choice xmlns:p14="http://schemas.microsoft.com/office/powerpoint/2010/main" Requires="p14">
+  <mc:AlternateContent xmlns:mc="http://schemas.openxmlformats.org/markup-compatibility/2006" xmlns:p14="http://schemas.microsoft.com/office/powerpoint/2010/main">
+    <mc:Choice Requires="p14">
       <p:transition spd="slow" p14:dur="1200">
         <p14:prism/>
       </p:transition>
     </mc:Choice>
-    <mc:Fallback>
+    <mc:Fallback xmlns="">
       <p:transition xmlns:p14="http://schemas.microsoft.com/office/powerpoint/2010/main" spd="slow">
         <p:fade/>
       </p:transition>
@@ -3349,7 +3370,7 @@
           <a:p>
             <a:fld id="{AAC28276-A769-E149-B889-75FF0F228566}" type="datetime1">
               <a:rPr lang="en-US" smtClean="0"/>
-              <a:t>9/16/15</a:t>
+              <a:t>9/25/16</a:t>
             </a:fld>
             <a:endParaRPr lang="en-US"/>
           </a:p>
@@ -3388,13 +3409,13 @@
   <p:clrMapOvr>
     <a:masterClrMapping/>
   </p:clrMapOvr>
-  <mc:AlternateContent xmlns:mc="http://schemas.openxmlformats.org/markup-compatibility/2006">
-    <mc:Choice xmlns:p14="http://schemas.microsoft.com/office/powerpoint/2010/main" Requires="p14">
+  <mc:AlternateContent xmlns:mc="http://schemas.openxmlformats.org/markup-compatibility/2006" xmlns:p14="http://schemas.microsoft.com/office/powerpoint/2010/main">
+    <mc:Choice Requires="p14">
       <p:transition spd="slow" p14:dur="1200">
         <p14:prism/>
       </p:transition>
     </mc:Choice>
-    <mc:Fallback>
+    <mc:Fallback xmlns="">
       <p:transition xmlns:p14="http://schemas.microsoft.com/office/powerpoint/2010/main" spd="slow">
         <p:fade/>
       </p:transition>
@@ -3403,7 +3424,7 @@
   <p:timing>
     <p:tnLst>
       <p:par>
-        <p:cTn xmlns:p14="http://schemas.microsoft.com/office/powerpoint/2010/main" id="1" dur="indefinite" restart="never" nodeType="tmRoot"/>
+        <p:cTn id="1" dur="indefinite" restart="never" nodeType="tmRoot"/>
       </p:par>
     </p:tnLst>
   </p:timing>
@@ -3516,7 +3537,7 @@
           <a:p>
             <a:fld id="{DB6D6608-2B33-7840-A402-08302B2F91E7}" type="datetime1">
               <a:rPr lang="en-US" smtClean="0"/>
-              <a:t>9/16/15</a:t>
+              <a:t>9/25/16</a:t>
             </a:fld>
             <a:endParaRPr lang="en-US"/>
           </a:p>
@@ -3555,13 +3576,13 @@
   <p:clrMapOvr>
     <a:masterClrMapping/>
   </p:clrMapOvr>
-  <mc:AlternateContent xmlns:mc="http://schemas.openxmlformats.org/markup-compatibility/2006">
-    <mc:Choice xmlns:p14="http://schemas.microsoft.com/office/powerpoint/2010/main" Requires="p14">
+  <mc:AlternateContent xmlns:mc="http://schemas.openxmlformats.org/markup-compatibility/2006" xmlns:p14="http://schemas.microsoft.com/office/powerpoint/2010/main">
+    <mc:Choice Requires="p14">
       <p:transition spd="slow" p14:dur="1200">
         <p14:prism/>
       </p:transition>
     </mc:Choice>
-    <mc:Fallback>
+    <mc:Fallback xmlns="">
       <p:transition xmlns:p14="http://schemas.microsoft.com/office/powerpoint/2010/main" spd="slow">
         <p:fade/>
       </p:transition>
@@ -3570,7 +3591,7 @@
   <p:timing>
     <p:tnLst>
       <p:par>
-        <p:cTn xmlns:p14="http://schemas.microsoft.com/office/powerpoint/2010/main" id="1" dur="indefinite" restart="never" nodeType="tmRoot"/>
+        <p:cTn id="1" dur="indefinite" restart="never" nodeType="tmRoot"/>
       </p:par>
     </p:tnLst>
   </p:timing>
@@ -3687,7 +3708,7 @@
           <a:p>
             <a:fld id="{7D36CC06-977F-C34F-A8E9-512B5F698430}" type="datetime1">
               <a:rPr lang="en-US" smtClean="0"/>
-              <a:t>9/16/15</a:t>
+              <a:t>9/25/16</a:t>
             </a:fld>
             <a:endParaRPr lang="en-US"/>
           </a:p>
@@ -3726,13 +3747,13 @@
   <p:clrMapOvr>
     <a:masterClrMapping/>
   </p:clrMapOvr>
-  <mc:AlternateContent xmlns:mc="http://schemas.openxmlformats.org/markup-compatibility/2006">
-    <mc:Choice xmlns:p14="http://schemas.microsoft.com/office/powerpoint/2010/main" Requires="p14">
+  <mc:AlternateContent xmlns:mc="http://schemas.openxmlformats.org/markup-compatibility/2006" xmlns:p14="http://schemas.microsoft.com/office/powerpoint/2010/main">
+    <mc:Choice Requires="p14">
       <p:transition spd="slow" p14:dur="1200">
         <p14:prism/>
       </p:transition>
     </mc:Choice>
-    <mc:Fallback>
+    <mc:Fallback xmlns="">
       <p:transition xmlns:p14="http://schemas.microsoft.com/office/powerpoint/2010/main" spd="slow">
         <p:fade/>
       </p:transition>
@@ -3741,7 +3762,7 @@
   <p:timing>
     <p:tnLst>
       <p:par>
-        <p:cTn xmlns:p14="http://schemas.microsoft.com/office/powerpoint/2010/main" id="1" dur="indefinite" restart="never" nodeType="tmRoot">
+        <p:cTn id="1" dur="indefinite" restart="never" nodeType="tmRoot">
           <p:childTnLst>
             <p:seq concurrent="1" nextAc="seek">
               <p:cTn id="2" restart="whenNotActive" fill="hold" evtFilter="cancelBubble" nodeType="interactiveSeq">
@@ -3953,7 +3974,7 @@
           <a:p>
             <a:fld id="{0E441806-5907-EB4C-B604-EEC2E7553A42}" type="datetime1">
               <a:rPr lang="en-US" smtClean="0"/>
-              <a:t>9/16/15</a:t>
+              <a:t>9/25/16</a:t>
             </a:fld>
             <a:endParaRPr lang="en-US"/>
           </a:p>
@@ -3992,13 +4013,13 @@
   <p:clrMapOvr>
     <a:masterClrMapping/>
   </p:clrMapOvr>
-  <mc:AlternateContent xmlns:mc="http://schemas.openxmlformats.org/markup-compatibility/2006">
-    <mc:Choice xmlns:p14="http://schemas.microsoft.com/office/powerpoint/2010/main" Requires="p14">
+  <mc:AlternateContent xmlns:mc="http://schemas.openxmlformats.org/markup-compatibility/2006" xmlns:p14="http://schemas.microsoft.com/office/powerpoint/2010/main">
+    <mc:Choice Requires="p14">
       <p:transition spd="slow" p14:dur="1200">
         <p14:prism/>
       </p:transition>
     </mc:Choice>
-    <mc:Fallback>
+    <mc:Fallback xmlns="">
       <p:transition xmlns:p14="http://schemas.microsoft.com/office/powerpoint/2010/main" spd="slow">
         <p:fade/>
       </p:transition>
@@ -4007,7 +4028,7 @@
   <p:timing>
     <p:tnLst>
       <p:par>
-        <p:cTn xmlns:p14="http://schemas.microsoft.com/office/powerpoint/2010/main" id="1" dur="indefinite" restart="never" nodeType="tmRoot"/>
+        <p:cTn id="1" dur="indefinite" restart="never" nodeType="tmRoot"/>
       </p:par>
     </p:tnLst>
   </p:timing>
@@ -4118,7 +4139,7 @@
           <a:p>
             <a:fld id="{BB67FC96-B8B6-D545-A6C4-66716D19D059}" type="datetime1">
               <a:rPr lang="en-US" smtClean="0"/>
-              <a:t>9/16/15</a:t>
+              <a:t>9/25/16</a:t>
             </a:fld>
             <a:endParaRPr lang="en-US"/>
           </a:p>
@@ -4157,13 +4178,13 @@
   <p:clrMapOvr>
     <a:masterClrMapping/>
   </p:clrMapOvr>
-  <mc:AlternateContent xmlns:mc="http://schemas.openxmlformats.org/markup-compatibility/2006">
-    <mc:Choice xmlns:p14="http://schemas.microsoft.com/office/powerpoint/2010/main" Requires="p14">
+  <mc:AlternateContent xmlns:mc="http://schemas.openxmlformats.org/markup-compatibility/2006" xmlns:p14="http://schemas.microsoft.com/office/powerpoint/2010/main">
+    <mc:Choice Requires="p14">
       <p:transition spd="slow" p14:dur="1200">
         <p14:prism/>
       </p:transition>
     </mc:Choice>
-    <mc:Fallback>
+    <mc:Fallback xmlns="">
       <p:transition xmlns:p14="http://schemas.microsoft.com/office/powerpoint/2010/main" spd="slow">
         <p:fade/>
       </p:transition>
@@ -4172,7 +4193,7 @@
   <p:timing>
     <p:tnLst>
       <p:par>
-        <p:cTn xmlns:p14="http://schemas.microsoft.com/office/powerpoint/2010/main" id="1" dur="indefinite" restart="never" nodeType="tmRoot"/>
+        <p:cTn id="1" dur="indefinite" restart="never" nodeType="tmRoot"/>
       </p:par>
     </p:tnLst>
   </p:timing>
@@ -4303,7 +4324,7 @@
           <a:p>
             <a:fld id="{97937718-4776-D04A-99C1-290699668AD4}" type="datetime1">
               <a:rPr lang="en-US" smtClean="0"/>
-              <a:t>9/16/15</a:t>
+              <a:t>9/25/16</a:t>
             </a:fld>
             <a:endParaRPr lang="en-US"/>
           </a:p>
@@ -4342,13 +4363,13 @@
   <p:clrMapOvr>
     <a:masterClrMapping/>
   </p:clrMapOvr>
-  <mc:AlternateContent xmlns:mc="http://schemas.openxmlformats.org/markup-compatibility/2006">
-    <mc:Choice xmlns:p14="http://schemas.microsoft.com/office/powerpoint/2010/main" Requires="p14">
+  <mc:AlternateContent xmlns:mc="http://schemas.openxmlformats.org/markup-compatibility/2006" xmlns:p14="http://schemas.microsoft.com/office/powerpoint/2010/main">
+    <mc:Choice Requires="p14">
       <p:transition spd="slow" p14:dur="1200">
         <p14:prism/>
       </p:transition>
     </mc:Choice>
-    <mc:Fallback>
+    <mc:Fallback xmlns="">
       <p:transition xmlns:p14="http://schemas.microsoft.com/office/powerpoint/2010/main" spd="slow">
         <p:fade/>
       </p:transition>
@@ -4357,7 +4378,7 @@
   <p:timing>
     <p:tnLst>
       <p:par>
-        <p:cTn xmlns:p14="http://schemas.microsoft.com/office/powerpoint/2010/main" id="1" dur="indefinite" restart="never" nodeType="tmRoot"/>
+        <p:cTn id="1" dur="indefinite" restart="never" nodeType="tmRoot"/>
       </p:par>
     </p:tnLst>
   </p:timing>
@@ -4468,7 +4489,7 @@
           <a:p>
             <a:fld id="{04AAD697-8BEB-E545-B7FA-194E46FA4F72}" type="datetime1">
               <a:rPr lang="en-US" smtClean="0"/>
-              <a:t>9/16/15</a:t>
+              <a:t>9/25/16</a:t>
             </a:fld>
             <a:endParaRPr lang="en-US"/>
           </a:p>
@@ -4507,13 +4528,13 @@
   <p:clrMapOvr>
     <a:masterClrMapping/>
   </p:clrMapOvr>
-  <mc:AlternateContent xmlns:mc="http://schemas.openxmlformats.org/markup-compatibility/2006">
-    <mc:Choice xmlns:p14="http://schemas.microsoft.com/office/powerpoint/2010/main" Requires="p14">
+  <mc:AlternateContent xmlns:mc="http://schemas.openxmlformats.org/markup-compatibility/2006" xmlns:p14="http://schemas.microsoft.com/office/powerpoint/2010/main">
+    <mc:Choice Requires="p14">
       <p:transition spd="slow" p14:dur="1200">
         <p14:prism/>
       </p:transition>
     </mc:Choice>
-    <mc:Fallback>
+    <mc:Fallback xmlns="">
       <p:transition xmlns:p14="http://schemas.microsoft.com/office/powerpoint/2010/main" spd="slow">
         <p:fade/>
       </p:transition>
@@ -4522,7 +4543,7 @@
   <p:timing>
     <p:tnLst>
       <p:par>
-        <p:cTn xmlns:p14="http://schemas.microsoft.com/office/powerpoint/2010/main" id="1" dur="indefinite" restart="never" nodeType="tmRoot"/>
+        <p:cTn id="1" dur="indefinite" restart="never" nodeType="tmRoot"/>
       </p:par>
     </p:tnLst>
   </p:timing>
@@ -4663,7 +4684,7 @@
           <a:p>
             <a:fld id="{2198DB1F-B6D6-BD40-A8E6-398D9A2AF3B2}" type="datetime1">
               <a:rPr lang="en-US" smtClean="0"/>
-              <a:t>9/16/15</a:t>
+              <a:t>9/25/16</a:t>
             </a:fld>
             <a:endParaRPr lang="en-US"/>
           </a:p>
@@ -4702,13 +4723,13 @@
   <p:clrMapOvr>
     <a:masterClrMapping/>
   </p:clrMapOvr>
-  <mc:AlternateContent xmlns:mc="http://schemas.openxmlformats.org/markup-compatibility/2006">
-    <mc:Choice xmlns:p14="http://schemas.microsoft.com/office/powerpoint/2010/main" Requires="p14">
+  <mc:AlternateContent xmlns:mc="http://schemas.openxmlformats.org/markup-compatibility/2006" xmlns:p14="http://schemas.microsoft.com/office/powerpoint/2010/main">
+    <mc:Choice Requires="p14">
       <p:transition spd="slow" p14:dur="1200">
         <p14:prism/>
       </p:transition>
     </mc:Choice>
-    <mc:Fallback>
+    <mc:Fallback xmlns="">
       <p:transition xmlns:p14="http://schemas.microsoft.com/office/powerpoint/2010/main" spd="slow">
         <p:fade/>
       </p:transition>
@@ -4717,7 +4738,7 @@
   <p:timing>
     <p:tnLst>
       <p:par>
-        <p:cTn xmlns:p14="http://schemas.microsoft.com/office/powerpoint/2010/main" id="1" dur="indefinite" restart="never" nodeType="tmRoot"/>
+        <p:cTn id="1" dur="indefinite" restart="never" nodeType="tmRoot"/>
       </p:par>
     </p:tnLst>
   </p:timing>
@@ -4822,7 +4843,7 @@
           <a:p>
             <a:fld id="{9A7B9AE0-4979-E64C-B7A8-CE33F4AF764A}" type="datetime1">
               <a:rPr lang="en-US" smtClean="0"/>
-              <a:t>9/16/15</a:t>
+              <a:t>9/25/16</a:t>
             </a:fld>
             <a:endParaRPr lang="en-US"/>
           </a:p>
@@ -4861,13 +4882,13 @@
   <p:clrMapOvr>
     <a:masterClrMapping/>
   </p:clrMapOvr>
-  <mc:AlternateContent xmlns:mc="http://schemas.openxmlformats.org/markup-compatibility/2006">
-    <mc:Choice xmlns:p14="http://schemas.microsoft.com/office/powerpoint/2010/main" Requires="p14">
+  <mc:AlternateContent xmlns:mc="http://schemas.openxmlformats.org/markup-compatibility/2006" xmlns:p14="http://schemas.microsoft.com/office/powerpoint/2010/main">
+    <mc:Choice Requires="p14">
       <p:transition spd="slow" p14:dur="1200">
         <p14:prism/>
       </p:transition>
     </mc:Choice>
-    <mc:Fallback>
+    <mc:Fallback xmlns="">
       <p:transition xmlns:p14="http://schemas.microsoft.com/office/powerpoint/2010/main" spd="slow">
         <p:fade/>
       </p:transition>
@@ -4876,7 +4897,7 @@
   <p:timing>
     <p:tnLst>
       <p:par>
-        <p:cTn xmlns:p14="http://schemas.microsoft.com/office/powerpoint/2010/main" id="1" dur="indefinite" restart="never" nodeType="tmRoot"/>
+        <p:cTn id="1" dur="indefinite" restart="never" nodeType="tmRoot"/>
       </p:par>
     </p:tnLst>
   </p:timing>
@@ -5025,7 +5046,7 @@
           <a:p>
             <a:fld id="{A3ECE4C5-002D-E24A-8AEF-056A5383A305}" type="datetime1">
               <a:rPr lang="en-US" smtClean="0"/>
-              <a:t>9/16/15</a:t>
+              <a:t>9/25/16</a:t>
             </a:fld>
             <a:endParaRPr lang="en-US"/>
           </a:p>
@@ -5064,13 +5085,13 @@
   <p:clrMapOvr>
     <a:masterClrMapping/>
   </p:clrMapOvr>
-  <mc:AlternateContent xmlns:mc="http://schemas.openxmlformats.org/markup-compatibility/2006">
-    <mc:Choice xmlns:p14="http://schemas.microsoft.com/office/powerpoint/2010/main" Requires="p14">
+  <mc:AlternateContent xmlns:mc="http://schemas.openxmlformats.org/markup-compatibility/2006" xmlns:p14="http://schemas.microsoft.com/office/powerpoint/2010/main">
+    <mc:Choice Requires="p14">
       <p:transition spd="slow" p14:dur="1200">
         <p14:prism/>
       </p:transition>
     </mc:Choice>
-    <mc:Fallback>
+    <mc:Fallback xmlns="">
       <p:transition xmlns:p14="http://schemas.microsoft.com/office/powerpoint/2010/main" spd="slow">
         <p:fade/>
       </p:transition>
@@ -5079,7 +5100,7 @@
   <p:timing>
     <p:tnLst>
       <p:par>
-        <p:cTn xmlns:p14="http://schemas.microsoft.com/office/powerpoint/2010/main" id="1" dur="indefinite" restart="never" nodeType="tmRoot"/>
+        <p:cTn id="1" dur="indefinite" restart="never" nodeType="tmRoot"/>
       </p:par>
     </p:tnLst>
   </p:timing>
@@ -5191,7 +5212,7 @@
           <a:p>
             <a:fld id="{6929D8CF-5F68-0F40-9784-79AEDEB3FE1C}" type="datetime1">
               <a:rPr lang="en-US" smtClean="0"/>
-              <a:t>9/16/15</a:t>
+              <a:t>9/25/16</a:t>
             </a:fld>
             <a:endParaRPr lang="en-US"/>
           </a:p>
@@ -5230,13 +5251,13 @@
   <p:clrMapOvr>
     <a:masterClrMapping/>
   </p:clrMapOvr>
-  <mc:AlternateContent xmlns:mc="http://schemas.openxmlformats.org/markup-compatibility/2006">
-    <mc:Choice xmlns:p14="http://schemas.microsoft.com/office/powerpoint/2010/main" Requires="p14">
+  <mc:AlternateContent xmlns:mc="http://schemas.openxmlformats.org/markup-compatibility/2006" xmlns:p14="http://schemas.microsoft.com/office/powerpoint/2010/main">
+    <mc:Choice Requires="p14">
       <p:transition spd="slow" p14:dur="1200">
         <p14:prism/>
       </p:transition>
     </mc:Choice>
-    <mc:Fallback>
+    <mc:Fallback xmlns="">
       <p:transition xmlns:p14="http://schemas.microsoft.com/office/powerpoint/2010/main" spd="slow">
         <p:fade/>
       </p:transition>
@@ -5245,7 +5266,7 @@
   <p:timing>
     <p:tnLst>
       <p:par>
-        <p:cTn xmlns:p14="http://schemas.microsoft.com/office/powerpoint/2010/main" id="1" dur="indefinite" restart="never" nodeType="tmRoot"/>
+        <p:cTn id="1" dur="indefinite" restart="never" nodeType="tmRoot"/>
       </p:par>
     </p:tnLst>
   </p:timing>
@@ -5366,7 +5387,7 @@
           <a:p>
             <a:fld id="{F580395B-4577-C54A-B36F-0495DFAF76D4}" type="datetime1">
               <a:rPr lang="en-US" smtClean="0"/>
-              <a:t>9/16/15</a:t>
+              <a:t>9/25/16</a:t>
             </a:fld>
             <a:endParaRPr lang="en-US"/>
           </a:p>
@@ -5428,13 +5449,13 @@
   <p:clrMapOvr>
     <a:masterClrMapping/>
   </p:clrMapOvr>
-  <mc:AlternateContent xmlns:mc="http://schemas.openxmlformats.org/markup-compatibility/2006">
-    <mc:Choice xmlns:p14="http://schemas.microsoft.com/office/powerpoint/2010/main" Requires="p14">
+  <mc:AlternateContent xmlns:mc="http://schemas.openxmlformats.org/markup-compatibility/2006" xmlns:p14="http://schemas.microsoft.com/office/powerpoint/2010/main">
+    <mc:Choice Requires="p14">
       <p:transition spd="slow" p14:dur="1200">
         <p14:prism/>
       </p:transition>
     </mc:Choice>
-    <mc:Fallback>
+    <mc:Fallback xmlns="">
       <p:transition xmlns:p14="http://schemas.microsoft.com/office/powerpoint/2010/main" spd="slow">
         <p:fade/>
       </p:transition>
@@ -5557,7 +5578,7 @@
           <a:p>
             <a:fld id="{74846060-5281-AF42-97B0-7223FF70B414}" type="datetime1">
               <a:rPr lang="en-US" smtClean="0"/>
-              <a:t>9/16/15</a:t>
+              <a:t>9/25/16</a:t>
             </a:fld>
             <a:endParaRPr lang="en-US"/>
           </a:p>
@@ -5619,13 +5640,13 @@
   <p:clrMapOvr>
     <a:masterClrMapping/>
   </p:clrMapOvr>
-  <mc:AlternateContent xmlns:mc="http://schemas.openxmlformats.org/markup-compatibility/2006">
-    <mc:Choice xmlns:p14="http://schemas.microsoft.com/office/powerpoint/2010/main" Requires="p14">
+  <mc:AlternateContent xmlns:mc="http://schemas.openxmlformats.org/markup-compatibility/2006" xmlns:p14="http://schemas.microsoft.com/office/powerpoint/2010/main">
+    <mc:Choice Requires="p14">
       <p:transition spd="slow" p14:dur="1200">
         <p14:prism/>
       </p:transition>
     </mc:Choice>
-    <mc:Fallback>
+    <mc:Fallback xmlns="">
       <p:transition xmlns:p14="http://schemas.microsoft.com/office/powerpoint/2010/main" spd="slow">
         <p:fade/>
       </p:transition>
@@ -5716,7 +5737,7 @@
           <a:p>
             <a:fld id="{99A094F9-9EB2-574B-89CF-004CA72CFED2}" type="datetime1">
               <a:rPr lang="en-US" smtClean="0"/>
-              <a:t>9/16/15</a:t>
+              <a:t>9/25/16</a:t>
             </a:fld>
             <a:endParaRPr lang="en-US"/>
           </a:p>
@@ -5778,13 +5799,13 @@
   <p:clrMapOvr>
     <a:masterClrMapping/>
   </p:clrMapOvr>
-  <mc:AlternateContent xmlns:mc="http://schemas.openxmlformats.org/markup-compatibility/2006">
-    <mc:Choice xmlns:p14="http://schemas.microsoft.com/office/powerpoint/2010/main" Requires="p14">
+  <mc:AlternateContent xmlns:mc="http://schemas.openxmlformats.org/markup-compatibility/2006" xmlns:p14="http://schemas.microsoft.com/office/powerpoint/2010/main">
+    <mc:Choice Requires="p14">
       <p:transition spd="slow" p14:dur="1200">
         <p14:prism/>
       </p:transition>
     </mc:Choice>
-    <mc:Fallback>
+    <mc:Fallback xmlns="">
       <p:transition xmlns:p14="http://schemas.microsoft.com/office/powerpoint/2010/main" spd="slow">
         <p:fade/>
       </p:transition>
@@ -5908,7 +5929,7 @@
           <a:p>
             <a:fld id="{5AA9E321-DB0D-7A48-A487-6DF630F44859}" type="datetime1">
               <a:rPr lang="en-US" smtClean="0"/>
-              <a:t>9/16/15</a:t>
+              <a:t>9/25/16</a:t>
             </a:fld>
             <a:endParaRPr lang="en-US"/>
           </a:p>
@@ -5970,13 +5991,13 @@
   <p:clrMapOvr>
     <a:masterClrMapping/>
   </p:clrMapOvr>
-  <mc:AlternateContent xmlns:mc="http://schemas.openxmlformats.org/markup-compatibility/2006">
-    <mc:Choice xmlns:p14="http://schemas.microsoft.com/office/powerpoint/2010/main" Requires="p14">
+  <mc:AlternateContent xmlns:mc="http://schemas.openxmlformats.org/markup-compatibility/2006" xmlns:p14="http://schemas.microsoft.com/office/powerpoint/2010/main">
+    <mc:Choice Requires="p14">
       <p:transition spd="slow" p14:dur="1200">
         <p14:prism/>
       </p:transition>
     </mc:Choice>
-    <mc:Fallback>
+    <mc:Fallback xmlns="">
       <p:transition xmlns:p14="http://schemas.microsoft.com/office/powerpoint/2010/main" spd="slow">
         <p:fade/>
       </p:transition>
@@ -6099,7 +6120,7 @@
           <a:p>
             <a:fld id="{D1B5FAD3-872C-F947-BC55-E0D7B216DA58}" type="datetime1">
               <a:rPr lang="en-US" smtClean="0"/>
-              <a:t>9/16/15</a:t>
+              <a:t>9/25/16</a:t>
             </a:fld>
             <a:endParaRPr lang="en-US"/>
           </a:p>
@@ -6161,13 +6182,13 @@
   <p:clrMapOvr>
     <a:masterClrMapping/>
   </p:clrMapOvr>
-  <mc:AlternateContent xmlns:mc="http://schemas.openxmlformats.org/markup-compatibility/2006">
-    <mc:Choice xmlns:p14="http://schemas.microsoft.com/office/powerpoint/2010/main" Requires="p14">
+  <mc:AlternateContent xmlns:mc="http://schemas.openxmlformats.org/markup-compatibility/2006" xmlns:p14="http://schemas.microsoft.com/office/powerpoint/2010/main">
+    <mc:Choice Requires="p14">
       <p:transition spd="slow" p14:dur="1200">
         <p14:prism/>
       </p:transition>
     </mc:Choice>
-    <mc:Fallback>
+    <mc:Fallback xmlns="">
       <p:transition xmlns:p14="http://schemas.microsoft.com/office/powerpoint/2010/main" spd="slow">
         <p:fade/>
       </p:transition>
@@ -6289,7 +6310,7 @@
           <a:p>
             <a:fld id="{A90993C7-3FEC-0D4C-9351-15FADBFBB703}" type="datetime1">
               <a:rPr lang="en-US" smtClean="0"/>
-              <a:t>9/16/15</a:t>
+              <a:t>9/25/16</a:t>
             </a:fld>
             <a:endParaRPr lang="en-US"/>
           </a:p>
@@ -6351,13 +6372,13 @@
   <p:clrMapOvr>
     <a:masterClrMapping/>
   </p:clrMapOvr>
-  <mc:AlternateContent xmlns:mc="http://schemas.openxmlformats.org/markup-compatibility/2006">
-    <mc:Choice xmlns:p14="http://schemas.microsoft.com/office/powerpoint/2010/main" Requires="p14">
+  <mc:AlternateContent xmlns:mc="http://schemas.openxmlformats.org/markup-compatibility/2006" xmlns:p14="http://schemas.microsoft.com/office/powerpoint/2010/main">
+    <mc:Choice Requires="p14">
       <p:transition spd="slow" p14:dur="1200">
         <p14:prism/>
       </p:transition>
     </mc:Choice>
-    <mc:Fallback>
+    <mc:Fallback xmlns="">
       <p:transition xmlns:p14="http://schemas.microsoft.com/office/powerpoint/2010/main" spd="slow">
         <p:fade/>
       </p:transition>
@@ -6423,7 +6444,11 @@
           <a:p>
             <a:r>
               <a:rPr lang="en-US" dirty="0" smtClean="0"/>
-              <a:t>The are how we measure success</a:t>
+              <a:t>These </a:t>
+            </a:r>
+            <a:r>
+              <a:rPr lang="en-US" dirty="0" smtClean="0"/>
+              <a:t>are how we measure success</a:t>
             </a:r>
           </a:p>
           <a:p>
@@ -6460,7 +6485,7 @@
           <a:p>
             <a:fld id="{850F5D7B-FF05-7140-81A9-3F1111B7EDD7}" type="datetime1">
               <a:rPr lang="en-US" smtClean="0"/>
-              <a:t>9/16/15</a:t>
+              <a:t>9/25/16</a:t>
             </a:fld>
             <a:endParaRPr lang="en-US"/>
           </a:p>
@@ -6522,13 +6547,13 @@
   <p:clrMapOvr>
     <a:masterClrMapping/>
   </p:clrMapOvr>
-  <mc:AlternateContent xmlns:mc="http://schemas.openxmlformats.org/markup-compatibility/2006">
-    <mc:Choice xmlns:p14="http://schemas.microsoft.com/office/powerpoint/2010/main" Requires="p14">
+  <mc:AlternateContent xmlns:mc="http://schemas.openxmlformats.org/markup-compatibility/2006" xmlns:p14="http://schemas.microsoft.com/office/powerpoint/2010/main">
+    <mc:Choice Requires="p14">
       <p:transition spd="slow" p14:dur="1200">
         <p14:prism/>
       </p:transition>
     </mc:Choice>
-    <mc:Fallback>
+    <mc:Fallback xmlns="">
       <p:transition xmlns:p14="http://schemas.microsoft.com/office/powerpoint/2010/main" spd="slow">
         <p:fade/>
       </p:transition>
@@ -6600,7 +6625,15 @@
           <a:p>
             <a:r>
               <a:rPr lang="en-US" dirty="0" smtClean="0"/>
-              <a:t>How are the combined?</a:t>
+              <a:t>How are </a:t>
+            </a:r>
+            <a:r>
+              <a:rPr lang="en-US" dirty="0" smtClean="0"/>
+              <a:t>they </a:t>
+            </a:r>
+            <a:r>
+              <a:rPr lang="en-US" dirty="0" smtClean="0"/>
+              <a:t>combined?</a:t>
             </a:r>
           </a:p>
           <a:p>
@@ -6654,7 +6687,7 @@
           <a:p>
             <a:fld id="{EFD6494E-0E81-524A-B01C-4B32F00D1D5D}" type="datetime1">
               <a:rPr lang="en-US" smtClean="0"/>
-              <a:t>9/16/15</a:t>
+              <a:t>9/25/16</a:t>
             </a:fld>
             <a:endParaRPr lang="en-US"/>
           </a:p>
@@ -6716,13 +6749,13 @@
   <p:clrMapOvr>
     <a:masterClrMapping/>
   </p:clrMapOvr>
-  <mc:AlternateContent xmlns:mc="http://schemas.openxmlformats.org/markup-compatibility/2006">
-    <mc:Choice xmlns:p14="http://schemas.microsoft.com/office/powerpoint/2010/main" Requires="p14">
+  <mc:AlternateContent xmlns:mc="http://schemas.openxmlformats.org/markup-compatibility/2006" xmlns:p14="http://schemas.microsoft.com/office/powerpoint/2010/main">
+    <mc:Choice Requires="p14">
       <p:transition spd="slow" p14:dur="1200">
         <p14:prism/>
       </p:transition>
     </mc:Choice>
-    <mc:Fallback>
+    <mc:Fallback xmlns="">
       <p:transition xmlns:p14="http://schemas.microsoft.com/office/powerpoint/2010/main" spd="slow">
         <p:fade/>
       </p:transition>
@@ -6835,7 +6868,7 @@
           <a:p>
             <a:fld id="{556BD1F0-7967-404B-9E0A-B01305661623}" type="datetime1">
               <a:rPr lang="en-US" smtClean="0"/>
-              <a:t>9/16/15</a:t>
+              <a:t>9/25/16</a:t>
             </a:fld>
             <a:endParaRPr lang="en-US"/>
           </a:p>
@@ -6897,13 +6930,13 @@
   <p:clrMapOvr>
     <a:masterClrMapping/>
   </p:clrMapOvr>
-  <mc:AlternateContent xmlns:mc="http://schemas.openxmlformats.org/markup-compatibility/2006">
-    <mc:Choice xmlns:p14="http://schemas.microsoft.com/office/powerpoint/2010/main" Requires="p14">
+  <mc:AlternateContent xmlns:mc="http://schemas.openxmlformats.org/markup-compatibility/2006" xmlns:p14="http://schemas.microsoft.com/office/powerpoint/2010/main">
+    <mc:Choice Requires="p14">
       <p:transition spd="slow" p14:dur="1200">
         <p14:prism/>
       </p:transition>
     </mc:Choice>
-    <mc:Fallback>
+    <mc:Fallback xmlns="">
       <p:transition xmlns:p14="http://schemas.microsoft.com/office/powerpoint/2010/main" spd="slow">
         <p:fade/>
       </p:transition>
@@ -6969,7 +7002,11 @@
           <a:p>
             <a:r>
               <a:rPr lang="en-US" dirty="0" smtClean="0"/>
-              <a:t>AKA programming</a:t>
+              <a:t>Aka </a:t>
+            </a:r>
+            <a:r>
+              <a:rPr lang="en-US" dirty="0" smtClean="0"/>
+              <a:t>programming</a:t>
             </a:r>
           </a:p>
           <a:p>
@@ -7011,7 +7048,7 @@
           <a:p>
             <a:fld id="{FA9AFEBD-6D10-8C40-BF32-A581B92B8113}" type="datetime1">
               <a:rPr lang="en-US" smtClean="0"/>
-              <a:t>9/16/15</a:t>
+              <a:t>9/25/16</a:t>
             </a:fld>
             <a:endParaRPr lang="en-US"/>
           </a:p>
@@ -7073,13 +7110,13 @@
   <p:clrMapOvr>
     <a:masterClrMapping/>
   </p:clrMapOvr>
-  <mc:AlternateContent xmlns:mc="http://schemas.openxmlformats.org/markup-compatibility/2006">
-    <mc:Choice xmlns:p14="http://schemas.microsoft.com/office/powerpoint/2010/main" Requires="p14">
+  <mc:AlternateContent xmlns:mc="http://schemas.openxmlformats.org/markup-compatibility/2006" xmlns:p14="http://schemas.microsoft.com/office/powerpoint/2010/main">
+    <mc:Choice Requires="p14">
       <p:transition spd="slow" p14:dur="1200">
         <p14:prism/>
       </p:transition>
     </mc:Choice>
-    <mc:Fallback>
+    <mc:Fallback xmlns="">
       <p:transition xmlns:p14="http://schemas.microsoft.com/office/powerpoint/2010/main" spd="slow">
         <p:fade/>
       </p:transition>
@@ -7236,7 +7273,7 @@
           <a:p>
             <a:fld id="{18F7E0D3-A500-1447-A3C2-DB7AAF44C9FA}" type="datetime1">
               <a:rPr lang="en-US" smtClean="0"/>
-              <a:t>9/16/15</a:t>
+              <a:t>9/25/16</a:t>
             </a:fld>
             <a:endParaRPr lang="en-US"/>
           </a:p>
@@ -7275,13 +7312,13 @@
   <p:clrMapOvr>
     <a:masterClrMapping/>
   </p:clrMapOvr>
-  <mc:AlternateContent xmlns:mc="http://schemas.openxmlformats.org/markup-compatibility/2006">
-    <mc:Choice xmlns:p14="http://schemas.microsoft.com/office/powerpoint/2010/main" Requires="p14">
+  <mc:AlternateContent xmlns:mc="http://schemas.openxmlformats.org/markup-compatibility/2006" xmlns:p14="http://schemas.microsoft.com/office/powerpoint/2010/main">
+    <mc:Choice Requires="p14">
       <p:transition spd="slow" p14:dur="1200">
         <p14:prism/>
       </p:transition>
     </mc:Choice>
-    <mc:Fallback>
+    <mc:Fallback xmlns="">
       <p:transition xmlns:p14="http://schemas.microsoft.com/office/powerpoint/2010/main" spd="slow">
         <p:fade/>
       </p:transition>
@@ -7290,7 +7327,7 @@
   <p:timing>
     <p:tnLst>
       <p:par>
-        <p:cTn xmlns:p14="http://schemas.microsoft.com/office/powerpoint/2010/main" id="1" dur="indefinite" restart="never" nodeType="tmRoot"/>
+        <p:cTn id="1" dur="indefinite" restart="never" nodeType="tmRoot"/>
       </p:par>
     </p:tnLst>
   </p:timing>
@@ -7354,7 +7391,23 @@
           <a:p>
             <a:r>
               <a:rPr lang="en-US" dirty="0" smtClean="0"/>
-              <a:t>A nice name of errors or mistakes</a:t>
+              <a:t>A </a:t>
+            </a:r>
+            <a:r>
+              <a:rPr lang="en-US" dirty="0" smtClean="0"/>
+              <a:t>“nice” </a:t>
+            </a:r>
+            <a:r>
+              <a:rPr lang="en-US" dirty="0" smtClean="0"/>
+              <a:t>name </a:t>
+            </a:r>
+            <a:r>
+              <a:rPr lang="en-US" dirty="0" smtClean="0"/>
+              <a:t>for errors </a:t>
+            </a:r>
+            <a:r>
+              <a:rPr lang="en-US" dirty="0" smtClean="0"/>
+              <a:t>or mistakes</a:t>
             </a:r>
           </a:p>
           <a:p>
@@ -7402,7 +7455,7 @@
           <a:p>
             <a:fld id="{E371E44B-BD9B-8F48-813E-1E4B4A0B59D7}" type="datetime1">
               <a:rPr lang="en-US" smtClean="0"/>
-              <a:t>9/16/15</a:t>
+              <a:t>9/25/16</a:t>
             </a:fld>
             <a:endParaRPr lang="en-US"/>
           </a:p>
@@ -7464,13 +7517,13 @@
   <p:clrMapOvr>
     <a:masterClrMapping/>
   </p:clrMapOvr>
-  <mc:AlternateContent xmlns:mc="http://schemas.openxmlformats.org/markup-compatibility/2006">
-    <mc:Choice xmlns:p14="http://schemas.microsoft.com/office/powerpoint/2010/main" Requires="p14">
+  <mc:AlternateContent xmlns:mc="http://schemas.openxmlformats.org/markup-compatibility/2006" xmlns:p14="http://schemas.microsoft.com/office/powerpoint/2010/main">
+    <mc:Choice Requires="p14">
       <p:transition spd="slow" p14:dur="1200">
         <p14:prism/>
       </p:transition>
     </mc:Choice>
-    <mc:Fallback>
+    <mc:Fallback xmlns="">
       <p:transition xmlns:p14="http://schemas.microsoft.com/office/powerpoint/2010/main" spd="slow">
         <p:fade/>
       </p:transition>
@@ -7555,7 +7608,7 @@
           <a:p>
             <a:fld id="{394FF76B-5A52-E843-A66F-6BE7B7BDA838}" type="datetime1">
               <a:rPr lang="en-US" smtClean="0"/>
-              <a:t>9/16/15</a:t>
+              <a:t>9/25/16</a:t>
             </a:fld>
             <a:endParaRPr lang="en-US"/>
           </a:p>
@@ -7617,13 +7670,13 @@
   <p:clrMapOvr>
     <a:masterClrMapping/>
   </p:clrMapOvr>
-  <mc:AlternateContent xmlns:mc="http://schemas.openxmlformats.org/markup-compatibility/2006">
-    <mc:Choice xmlns:p14="http://schemas.microsoft.com/office/powerpoint/2010/main" Requires="p14">
+  <mc:AlternateContent xmlns:mc="http://schemas.openxmlformats.org/markup-compatibility/2006" xmlns:p14="http://schemas.microsoft.com/office/powerpoint/2010/main">
+    <mc:Choice Requires="p14">
       <p:transition spd="slow" p14:dur="1200">
         <p14:prism/>
       </p:transition>
     </mc:Choice>
-    <mc:Fallback>
+    <mc:Fallback xmlns="">
       <p:transition xmlns:p14="http://schemas.microsoft.com/office/powerpoint/2010/main" spd="slow">
         <p:fade/>
       </p:transition>
@@ -7746,7 +7799,7 @@
           <a:p>
             <a:fld id="{77FC8702-19E8-884A-A9CA-2C4214C0B4EB}" type="datetime1">
               <a:rPr lang="en-US" smtClean="0"/>
-              <a:t>9/16/15</a:t>
+              <a:t>9/25/16</a:t>
             </a:fld>
             <a:endParaRPr lang="en-US"/>
           </a:p>
@@ -7808,13 +7861,13 @@
   <p:clrMapOvr>
     <a:masterClrMapping/>
   </p:clrMapOvr>
-  <mc:AlternateContent xmlns:mc="http://schemas.openxmlformats.org/markup-compatibility/2006">
-    <mc:Choice xmlns:p14="http://schemas.microsoft.com/office/powerpoint/2010/main" Requires="p14">
+  <mc:AlternateContent xmlns:mc="http://schemas.openxmlformats.org/markup-compatibility/2006" xmlns:p14="http://schemas.microsoft.com/office/powerpoint/2010/main">
+    <mc:Choice Requires="p14">
       <p:transition spd="slow" p14:dur="1200">
         <p14:prism/>
       </p:transition>
     </mc:Choice>
-    <mc:Fallback>
+    <mc:Fallback xmlns="">
       <p:transition xmlns:p14="http://schemas.microsoft.com/office/powerpoint/2010/main" spd="slow">
         <p:fade/>
       </p:transition>
@@ -7921,7 +7974,7 @@
           <a:p>
             <a:fld id="{EB728C66-250A-2D40-A215-E202345A78BF}" type="datetime1">
               <a:rPr lang="en-US" smtClean="0"/>
-              <a:t>9/16/15</a:t>
+              <a:t>9/25/16</a:t>
             </a:fld>
             <a:endParaRPr lang="en-US"/>
           </a:p>
@@ -7983,13 +8036,13 @@
   <p:clrMapOvr>
     <a:masterClrMapping/>
   </p:clrMapOvr>
-  <mc:AlternateContent xmlns:mc="http://schemas.openxmlformats.org/markup-compatibility/2006">
-    <mc:Choice xmlns:p14="http://schemas.microsoft.com/office/powerpoint/2010/main" Requires="p14">
+  <mc:AlternateContent xmlns:mc="http://schemas.openxmlformats.org/markup-compatibility/2006" xmlns:p14="http://schemas.microsoft.com/office/powerpoint/2010/main">
+    <mc:Choice Requires="p14">
       <p:transition spd="slow" p14:dur="1200">
         <p14:prism/>
       </p:transition>
     </mc:Choice>
-    <mc:Fallback>
+    <mc:Fallback xmlns="">
       <p:transition xmlns:p14="http://schemas.microsoft.com/office/powerpoint/2010/main" spd="slow">
         <p:fade/>
       </p:transition>
@@ -8115,7 +8168,7 @@
           <a:p>
             <a:fld id="{784E97DF-408B-9F4A-A488-510E850CA50A}" type="datetime1">
               <a:rPr lang="en-US" smtClean="0"/>
-              <a:t>9/16/15</a:t>
+              <a:t>9/25/16</a:t>
             </a:fld>
             <a:endParaRPr lang="en-US"/>
           </a:p>
@@ -8177,13 +8230,13 @@
   <p:clrMapOvr>
     <a:masterClrMapping/>
   </p:clrMapOvr>
-  <mc:AlternateContent xmlns:mc="http://schemas.openxmlformats.org/markup-compatibility/2006">
-    <mc:Choice xmlns:p14="http://schemas.microsoft.com/office/powerpoint/2010/main" Requires="p14">
+  <mc:AlternateContent xmlns:mc="http://schemas.openxmlformats.org/markup-compatibility/2006" xmlns:p14="http://schemas.microsoft.com/office/powerpoint/2010/main">
+    <mc:Choice Requires="p14">
       <p:transition spd="slow" p14:dur="1200">
         <p14:prism/>
       </p:transition>
     </mc:Choice>
-    <mc:Fallback>
+    <mc:Fallback xmlns="">
       <p:transition xmlns:p14="http://schemas.microsoft.com/office/powerpoint/2010/main" spd="slow">
         <p:fade/>
       </p:transition>
@@ -8678,7 +8731,7 @@
           <a:p>
             <a:fld id="{2B798F6A-34C0-A747-B454-5183B1D03C2D}" type="datetime1">
               <a:rPr lang="en-US" smtClean="0"/>
-              <a:t>9/16/15</a:t>
+              <a:t>9/25/16</a:t>
             </a:fld>
             <a:endParaRPr lang="en-US"/>
           </a:p>
@@ -8740,13 +8793,13 @@
   <p:clrMapOvr>
     <a:masterClrMapping/>
   </p:clrMapOvr>
-  <mc:AlternateContent xmlns:mc="http://schemas.openxmlformats.org/markup-compatibility/2006">
-    <mc:Choice xmlns:p14="http://schemas.microsoft.com/office/powerpoint/2010/main" Requires="p14">
+  <mc:AlternateContent xmlns:mc="http://schemas.openxmlformats.org/markup-compatibility/2006" xmlns:p14="http://schemas.microsoft.com/office/powerpoint/2010/main">
+    <mc:Choice Requires="p14">
       <p:transition spd="slow" p14:dur="1200">
         <p14:prism/>
       </p:transition>
     </mc:Choice>
-    <mc:Fallback>
+    <mc:Fallback xmlns="">
       <p:transition xmlns:p14="http://schemas.microsoft.com/office/powerpoint/2010/main" spd="slow">
         <p:fade/>
       </p:transition>
@@ -9709,7 +9762,7 @@
           <a:p>
             <a:fld id="{683731AB-7694-364C-AB7C-C98905CA5960}" type="datetime1">
               <a:rPr lang="en-US" smtClean="0"/>
-              <a:t>9/16/15</a:t>
+              <a:t>9/25/16</a:t>
             </a:fld>
             <a:endParaRPr lang="en-US"/>
           </a:p>
@@ -9771,13 +9824,13 @@
   <p:clrMapOvr>
     <a:masterClrMapping/>
   </p:clrMapOvr>
-  <mc:AlternateContent xmlns:mc="http://schemas.openxmlformats.org/markup-compatibility/2006">
-    <mc:Choice xmlns:p14="http://schemas.microsoft.com/office/powerpoint/2010/main" Requires="p14">
+  <mc:AlternateContent xmlns:mc="http://schemas.openxmlformats.org/markup-compatibility/2006" xmlns:p14="http://schemas.microsoft.com/office/powerpoint/2010/main">
+    <mc:Choice Requires="p14">
       <p:transition spd="slow" p14:dur="1200">
         <p14:prism/>
       </p:transition>
     </mc:Choice>
-    <mc:Fallback>
+    <mc:Fallback xmlns="">
       <p:transition xmlns:p14="http://schemas.microsoft.com/office/powerpoint/2010/main" spd="slow">
         <p:fade/>
       </p:transition>
@@ -10807,7 +10860,7 @@
           <a:p>
             <a:fld id="{D33759D7-AD1B-3844-8947-64E6B909D9FB}" type="datetime1">
               <a:rPr lang="en-US" smtClean="0"/>
-              <a:t>9/16/15</a:t>
+              <a:t>9/25/16</a:t>
             </a:fld>
             <a:endParaRPr lang="en-US"/>
           </a:p>
@@ -10869,13 +10922,13 @@
   <p:clrMapOvr>
     <a:masterClrMapping/>
   </p:clrMapOvr>
-  <mc:AlternateContent xmlns:mc="http://schemas.openxmlformats.org/markup-compatibility/2006">
-    <mc:Choice xmlns:p14="http://schemas.microsoft.com/office/powerpoint/2010/main" Requires="p14">
+  <mc:AlternateContent xmlns:mc="http://schemas.openxmlformats.org/markup-compatibility/2006" xmlns:p14="http://schemas.microsoft.com/office/powerpoint/2010/main">
+    <mc:Choice Requires="p14">
       <p:transition spd="slow" p14:dur="1200">
         <p14:prism/>
       </p:transition>
     </mc:Choice>
-    <mc:Fallback>
+    <mc:Fallback xmlns="">
       <p:transition xmlns:p14="http://schemas.microsoft.com/office/powerpoint/2010/main" spd="slow">
         <p:fade/>
       </p:transition>
@@ -10955,7 +11008,18 @@
               <a:t> </a:t>
             </a:r>
             <a:r>
-              <a:rPr lang="en-US" dirty="0" err="1">
+              <a:rPr lang="en-US" dirty="0" smtClean="0">
+                <a:solidFill>
+                  <a:srgbClr val="4C2F2D"/>
+                </a:solidFill>
+                <a:latin typeface="Menlo"/>
+                <a:ea typeface="Menlo"/>
+                <a:cs typeface="Menlo"/>
+              </a:rPr>
+              <a:t>	 </a:t>
+            </a:r>
+            <a:r>
+              <a:rPr lang="en-US" dirty="0" err="1" smtClean="0">
                 <a:solidFill>
                   <a:srgbClr val="00A3AF"/>
                 </a:solidFill>
@@ -10966,6 +11030,17 @@
               <a:t>xorl</a:t>
             </a:r>
             <a:r>
+              <a:rPr lang="en-US" dirty="0" smtClean="0">
+                <a:solidFill>
+                  <a:srgbClr val="4C2F2D"/>
+                </a:solidFill>
+                <a:latin typeface="Menlo"/>
+                <a:ea typeface="Menlo"/>
+                <a:cs typeface="Menlo"/>
+              </a:rPr>
+              <a:t>    </a:t>
+            </a:r>
+            <a:r>
               <a:rPr lang="en-US" dirty="0">
                 <a:solidFill>
                   <a:srgbClr val="4C2F2D"/>
@@ -10974,7 +11049,7 @@
                 <a:ea typeface="Menlo"/>
                 <a:cs typeface="Menlo"/>
               </a:rPr>
-              <a:t>    %</a:t>
+              <a:t>%</a:t>
             </a:r>
             <a:r>
               <a:rPr lang="en-US" dirty="0" err="1">
@@ -11796,7 +11871,7 @@
           <a:p>
             <a:fld id="{76AA8370-437A-1348-A52B-9788A8C7B451}" type="datetime1">
               <a:rPr lang="en-US" smtClean="0"/>
-              <a:t>9/16/15</a:t>
+              <a:t>9/25/16</a:t>
             </a:fld>
             <a:endParaRPr lang="en-US"/>
           </a:p>
@@ -11858,13 +11933,13 @@
   <p:clrMapOvr>
     <a:masterClrMapping/>
   </p:clrMapOvr>
-  <mc:AlternateContent xmlns:mc="http://schemas.openxmlformats.org/markup-compatibility/2006">
-    <mc:Choice xmlns:p14="http://schemas.microsoft.com/office/powerpoint/2010/main" Requires="p14">
+  <mc:AlternateContent xmlns:mc="http://schemas.openxmlformats.org/markup-compatibility/2006" xmlns:p14="http://schemas.microsoft.com/office/powerpoint/2010/main">
+    <mc:Choice Requires="p14">
       <p:transition spd="slow" p14:dur="1200">
         <p14:prism/>
       </p:transition>
     </mc:Choice>
-    <mc:Fallback>
+    <mc:Fallback xmlns="">
       <p:transition xmlns:p14="http://schemas.microsoft.com/office/powerpoint/2010/main" spd="slow">
         <p:fade/>
       </p:transition>
@@ -11990,7 +12065,7 @@
           <a:p>
             <a:fld id="{5E5DCFFE-F157-0340-A57F-541E4F3CF8A7}" type="datetime1">
               <a:rPr lang="en-US" smtClean="0"/>
-              <a:t>9/16/15</a:t>
+              <a:t>9/25/16</a:t>
             </a:fld>
             <a:endParaRPr lang="en-US"/>
           </a:p>
@@ -12052,13 +12127,13 @@
   <p:clrMapOvr>
     <a:masterClrMapping/>
   </p:clrMapOvr>
-  <mc:AlternateContent xmlns:mc="http://schemas.openxmlformats.org/markup-compatibility/2006">
-    <mc:Choice xmlns:p14="http://schemas.microsoft.com/office/powerpoint/2010/main" Requires="p14">
+  <mc:AlternateContent xmlns:mc="http://schemas.openxmlformats.org/markup-compatibility/2006" xmlns:p14="http://schemas.microsoft.com/office/powerpoint/2010/main">
+    <mc:Choice Requires="p14">
       <p:transition spd="slow" p14:dur="1200">
         <p14:prism/>
       </p:transition>
     </mc:Choice>
-    <mc:Fallback>
+    <mc:Fallback xmlns="">
       <p:transition xmlns:p14="http://schemas.microsoft.com/office/powerpoint/2010/main" spd="slow">
         <p:fade/>
       </p:transition>
@@ -12200,7 +12275,7 @@
           <a:p>
             <a:fld id="{EE19ADFF-E085-DA41-9356-A0F0C81FAA5F}" type="datetime1">
               <a:rPr lang="en-US" smtClean="0"/>
-              <a:t>9/16/15</a:t>
+              <a:t>9/25/16</a:t>
             </a:fld>
             <a:endParaRPr lang="en-US"/>
           </a:p>
@@ -12239,13 +12314,13 @@
   <p:clrMapOvr>
     <a:masterClrMapping/>
   </p:clrMapOvr>
-  <mc:AlternateContent xmlns:mc="http://schemas.openxmlformats.org/markup-compatibility/2006">
-    <mc:Choice xmlns:p14="http://schemas.microsoft.com/office/powerpoint/2010/main" Requires="p14">
+  <mc:AlternateContent xmlns:mc="http://schemas.openxmlformats.org/markup-compatibility/2006" xmlns:p14="http://schemas.microsoft.com/office/powerpoint/2010/main">
+    <mc:Choice Requires="p14">
       <p:transition spd="slow" p14:dur="1200">
         <p14:prism/>
       </p:transition>
     </mc:Choice>
-    <mc:Fallback>
+    <mc:Fallback xmlns="">
       <p:transition xmlns:p14="http://schemas.microsoft.com/office/powerpoint/2010/main" spd="slow">
         <p:fade/>
       </p:transition>
@@ -12254,7 +12329,7 @@
   <p:timing>
     <p:tnLst>
       <p:par>
-        <p:cTn xmlns:p14="http://schemas.microsoft.com/office/powerpoint/2010/main" id="1" dur="indefinite" restart="never" nodeType="tmRoot"/>
+        <p:cTn id="1" dur="indefinite" restart="never" nodeType="tmRoot"/>
       </p:par>
     </p:tnLst>
   </p:timing>
@@ -12368,7 +12443,7 @@
           <a:p>
             <a:fld id="{5B81E247-BBD6-D84F-A474-5397245A425A}" type="datetime1">
               <a:rPr lang="en-US" smtClean="0"/>
-              <a:t>9/16/15</a:t>
+              <a:t>9/25/16</a:t>
             </a:fld>
             <a:endParaRPr lang="en-US"/>
           </a:p>
@@ -12430,13 +12505,13 @@
   <p:clrMapOvr>
     <a:masterClrMapping/>
   </p:clrMapOvr>
-  <mc:AlternateContent xmlns:mc="http://schemas.openxmlformats.org/markup-compatibility/2006">
-    <mc:Choice xmlns:p14="http://schemas.microsoft.com/office/powerpoint/2010/main" Requires="p14">
+  <mc:AlternateContent xmlns:mc="http://schemas.openxmlformats.org/markup-compatibility/2006" xmlns:p14="http://schemas.microsoft.com/office/powerpoint/2010/main">
+    <mc:Choice Requires="p14">
       <p:transition spd="slow" p14:dur="1200">
         <p14:prism/>
       </p:transition>
     </mc:Choice>
-    <mc:Fallback>
+    <mc:Fallback xmlns="">
       <p:transition xmlns:p14="http://schemas.microsoft.com/office/powerpoint/2010/main" spd="slow">
         <p:fade/>
       </p:transition>
@@ -12579,7 +12654,7 @@
           <a:p>
             <a:fld id="{ECD7DBC8-68F9-2244-BFF4-FCE3A2A9FE89}" type="datetime1">
               <a:rPr lang="en-US" smtClean="0"/>
-              <a:t>9/16/15</a:t>
+              <a:t>9/25/16</a:t>
             </a:fld>
             <a:endParaRPr lang="en-US"/>
           </a:p>
@@ -12641,13 +12716,13 @@
   <p:clrMapOvr>
     <a:masterClrMapping/>
   </p:clrMapOvr>
-  <mc:AlternateContent xmlns:mc="http://schemas.openxmlformats.org/markup-compatibility/2006">
-    <mc:Choice xmlns:p14="http://schemas.microsoft.com/office/powerpoint/2010/main" Requires="p14">
+  <mc:AlternateContent xmlns:mc="http://schemas.openxmlformats.org/markup-compatibility/2006" xmlns:p14="http://schemas.microsoft.com/office/powerpoint/2010/main">
+    <mc:Choice Requires="p14">
       <p:transition spd="slow" p14:dur="1200">
         <p14:prism/>
       </p:transition>
     </mc:Choice>
-    <mc:Fallback>
+    <mc:Fallback xmlns="">
       <p:transition xmlns:p14="http://schemas.microsoft.com/office/powerpoint/2010/main" spd="slow">
         <p:fade/>
       </p:transition>
@@ -12734,8 +12809,9 @@
             <a:pPr lvl="1"/>
             <a:r>
               <a:rPr lang="en-US" dirty="0" smtClean="0"/>
-              <a:t>Scratch</a:t>
-            </a:r>
+              <a:t>Scratch, Snap</a:t>
+            </a:r>
+            <a:endParaRPr lang="en-US" dirty="0" smtClean="0"/>
           </a:p>
         </p:txBody>
       </p:sp>
@@ -12756,7 +12832,7 @@
           <a:p>
             <a:fld id="{7AF9E9F3-B193-C140-8224-D590C87D1C17}" type="datetime1">
               <a:rPr lang="en-US" smtClean="0"/>
-              <a:t>9/16/15</a:t>
+              <a:t>9/25/16</a:t>
             </a:fld>
             <a:endParaRPr lang="en-US"/>
           </a:p>
@@ -12818,13 +12894,13 @@
   <p:clrMapOvr>
     <a:masterClrMapping/>
   </p:clrMapOvr>
-  <mc:AlternateContent xmlns:mc="http://schemas.openxmlformats.org/markup-compatibility/2006">
-    <mc:Choice xmlns:p14="http://schemas.microsoft.com/office/powerpoint/2010/main" Requires="p14">
+  <mc:AlternateContent xmlns:mc="http://schemas.openxmlformats.org/markup-compatibility/2006" xmlns:p14="http://schemas.microsoft.com/office/powerpoint/2010/main">
+    <mc:Choice Requires="p14">
       <p:transition spd="slow" p14:dur="1200">
         <p14:prism/>
       </p:transition>
     </mc:Choice>
-    <mc:Fallback>
+    <mc:Fallback xmlns="">
       <p:transition xmlns:p14="http://schemas.microsoft.com/office/powerpoint/2010/main" spd="slow">
         <p:fade/>
       </p:transition>
@@ -12896,14 +12972,24 @@
           <a:p>
             <a:r>
               <a:rPr lang="en-US" dirty="0" smtClean="0"/>
-              <a:t>C: scientific, operating systems</a:t>
-            </a:r>
-          </a:p>
-          <a:p>
-            <a:r>
-              <a:rPr lang="en-US" dirty="0" smtClean="0"/>
-              <a:t>C++: somewhere between C and Java</a:t>
-            </a:r>
+              <a:t>C: scientific, operating </a:t>
+            </a:r>
+            <a:r>
+              <a:rPr lang="en-US" dirty="0" smtClean="0"/>
+              <a:t>systems, embedded</a:t>
+            </a:r>
+            <a:endParaRPr lang="en-US" dirty="0" smtClean="0"/>
+          </a:p>
+          <a:p>
+            <a:r>
+              <a:rPr lang="en-US" dirty="0" smtClean="0"/>
+              <a:t>C++: somewhere between C and </a:t>
+            </a:r>
+            <a:r>
+              <a:rPr lang="en-US" dirty="0" smtClean="0"/>
+              <a:t>Java (historically, C first, then C++, then Java)</a:t>
+            </a:r>
+            <a:endParaRPr lang="en-US" dirty="0" smtClean="0"/>
           </a:p>
           <a:p>
             <a:r>
@@ -12937,7 +13023,7 @@
           <a:p>
             <a:fld id="{66E937CF-EEBF-ED4D-9709-3AD036C0B70E}" type="datetime1">
               <a:rPr lang="en-US" smtClean="0"/>
-              <a:t>9/16/15</a:t>
+              <a:t>9/25/16</a:t>
             </a:fld>
             <a:endParaRPr lang="en-US"/>
           </a:p>
@@ -12999,13 +13085,13 @@
   <p:clrMapOvr>
     <a:masterClrMapping/>
   </p:clrMapOvr>
-  <mc:AlternateContent xmlns:mc="http://schemas.openxmlformats.org/markup-compatibility/2006">
-    <mc:Choice xmlns:p14="http://schemas.microsoft.com/office/powerpoint/2010/main" Requires="p14">
+  <mc:AlternateContent xmlns:mc="http://schemas.openxmlformats.org/markup-compatibility/2006" xmlns:p14="http://schemas.microsoft.com/office/powerpoint/2010/main">
+    <mc:Choice Requires="p14">
       <p:transition spd="slow" p14:dur="1200">
         <p14:prism/>
       </p:transition>
     </mc:Choice>
-    <mc:Fallback>
+    <mc:Fallback xmlns="">
       <p:transition xmlns:p14="http://schemas.microsoft.com/office/powerpoint/2010/main" spd="slow">
         <p:fade/>
       </p:transition>
@@ -13084,7 +13170,11 @@
             <a:pPr lvl="1"/>
             <a:r>
               <a:rPr lang="en-US" dirty="0" smtClean="0"/>
-              <a:t>User only know their own needs</a:t>
+              <a:t>Users </a:t>
+            </a:r>
+            <a:r>
+              <a:rPr lang="en-US" dirty="0" smtClean="0"/>
+              <a:t>only know their own needs</a:t>
             </a:r>
           </a:p>
           <a:p>
@@ -13114,7 +13204,7 @@
           <a:p>
             <a:fld id="{743544EB-9381-3243-AF9A-D01EB69CB7D2}" type="datetime1">
               <a:rPr lang="en-US" smtClean="0"/>
-              <a:t>9/16/15</a:t>
+              <a:t>9/25/16</a:t>
             </a:fld>
             <a:endParaRPr lang="en-US"/>
           </a:p>
@@ -13176,13 +13266,13 @@
   <p:clrMapOvr>
     <a:masterClrMapping/>
   </p:clrMapOvr>
-  <mc:AlternateContent xmlns:mc="http://schemas.openxmlformats.org/markup-compatibility/2006">
-    <mc:Choice xmlns:p14="http://schemas.microsoft.com/office/powerpoint/2010/main" Requires="p14">
+  <mc:AlternateContent xmlns:mc="http://schemas.openxmlformats.org/markup-compatibility/2006" xmlns:p14="http://schemas.microsoft.com/office/powerpoint/2010/main">
+    <mc:Choice Requires="p14">
       <p:transition spd="slow" p14:dur="1200">
         <p14:prism/>
       </p:transition>
     </mc:Choice>
-    <mc:Fallback>
+    <mc:Fallback xmlns="">
       <p:transition xmlns:p14="http://schemas.microsoft.com/office/powerpoint/2010/main" spd="slow">
         <p:fade/>
       </p:transition>
@@ -13256,14 +13346,30 @@
             <a:pPr lvl="1"/>
             <a:r>
               <a:rPr lang="en-US" dirty="0" smtClean="0"/>
-              <a:t>Paper and pencil users don’t know what’s possible</a:t>
+              <a:t>Paper and </a:t>
+            </a:r>
+            <a:r>
+              <a:rPr lang="en-US" dirty="0" smtClean="0"/>
+              <a:t>pencil; </a:t>
+            </a:r>
+            <a:r>
+              <a:rPr lang="en-US" dirty="0" smtClean="0"/>
+              <a:t>users don’t know what’s possible</a:t>
             </a:r>
           </a:p>
           <a:p>
             <a:pPr lvl="1"/>
             <a:r>
               <a:rPr lang="en-US" dirty="0" smtClean="0"/>
-              <a:t>Publishers want markup usual user doesn’t need</a:t>
+              <a:t>Publishers want </a:t>
+            </a:r>
+            <a:r>
+              <a:rPr lang="en-US" dirty="0" smtClean="0"/>
+              <a:t>markup; </a:t>
+            </a:r>
+            <a:r>
+              <a:rPr lang="en-US" dirty="0" smtClean="0"/>
+              <a:t>usual user doesn’t need</a:t>
             </a:r>
           </a:p>
           <a:p>
@@ -13277,18 +13383,11 @@
             </a:r>
             <a:r>
               <a:rPr lang="en-US" dirty="0" smtClean="0"/>
-              <a:t>future”</a:t>
-            </a:r>
-          </a:p>
-          <a:p>
-            <a:pPr lvl="1"/>
-            <a:r>
-              <a:rPr lang="en-US" dirty="0" err="1" smtClean="0"/>
-              <a:t>Niels</a:t>
-            </a:r>
-            <a:r>
-              <a:rPr lang="en-US" dirty="0" smtClean="0"/>
-              <a:t> Bohr</a:t>
+              <a:t>future” -- Niels </a:t>
+            </a:r>
+            <a:r>
+              <a:rPr lang="en-US" dirty="0" smtClean="0"/>
+              <a:t>Bohr</a:t>
             </a:r>
           </a:p>
           <a:p>
@@ -13336,7 +13435,7 @@
           <a:p>
             <a:fld id="{9AA33406-5C02-7742-83A3-A04FE6399A0D}" type="datetime1">
               <a:rPr lang="en-US" smtClean="0"/>
-              <a:t>9/16/15</a:t>
+              <a:t>9/25/16</a:t>
             </a:fld>
             <a:endParaRPr lang="en-US"/>
           </a:p>
@@ -13398,13 +13497,13 @@
   <p:clrMapOvr>
     <a:masterClrMapping/>
   </p:clrMapOvr>
-  <mc:AlternateContent xmlns:mc="http://schemas.openxmlformats.org/markup-compatibility/2006">
-    <mc:Choice xmlns:p14="http://schemas.microsoft.com/office/powerpoint/2010/main" Requires="p14">
+  <mc:AlternateContent xmlns:mc="http://schemas.openxmlformats.org/markup-compatibility/2006" xmlns:p14="http://schemas.microsoft.com/office/powerpoint/2010/main">
+    <mc:Choice Requires="p14">
       <p:transition spd="slow" p14:dur="1200">
         <p14:prism/>
       </p:transition>
     </mc:Choice>
-    <mc:Fallback>
+    <mc:Fallback xmlns="">
       <p:transition xmlns:p14="http://schemas.microsoft.com/office/powerpoint/2010/main" spd="slow">
         <p:fade/>
       </p:transition>
@@ -13477,7 +13576,11 @@
             <a:pPr lvl="1"/>
             <a:r>
               <a:rPr lang="en-US" dirty="0" smtClean="0"/>
-              <a:t>Gets into users’ hands</a:t>
+              <a:t>Get it </a:t>
+            </a:r>
+            <a:r>
+              <a:rPr lang="en-US" dirty="0" smtClean="0"/>
+              <a:t>into users’ hands</a:t>
             </a:r>
           </a:p>
           <a:p>
@@ -13532,7 +13635,7 @@
           <a:p>
             <a:fld id="{BC50C859-5C61-2F4A-BACA-4175FEA8B7C4}" type="datetime1">
               <a:rPr lang="en-US" smtClean="0"/>
-              <a:t>9/16/15</a:t>
+              <a:t>9/25/16</a:t>
             </a:fld>
             <a:endParaRPr lang="en-US"/>
           </a:p>
@@ -13594,13 +13697,13 @@
   <p:clrMapOvr>
     <a:masterClrMapping/>
   </p:clrMapOvr>
-  <mc:AlternateContent xmlns:mc="http://schemas.openxmlformats.org/markup-compatibility/2006">
-    <mc:Choice xmlns:p14="http://schemas.microsoft.com/office/powerpoint/2010/main" Requires="p14">
+  <mc:AlternateContent xmlns:mc="http://schemas.openxmlformats.org/markup-compatibility/2006" xmlns:p14="http://schemas.microsoft.com/office/powerpoint/2010/main">
+    <mc:Choice Requires="p14">
       <p:transition spd="slow" p14:dur="1200">
         <p14:prism/>
       </p:transition>
     </mc:Choice>
-    <mc:Fallback>
+    <mc:Fallback xmlns="">
       <p:transition xmlns:p14="http://schemas.microsoft.com/office/powerpoint/2010/main" spd="slow">
         <p:fade/>
       </p:transition>
@@ -13700,7 +13803,7 @@
           <a:p>
             <a:fld id="{B9203859-C570-E442-836E-E07C440A24B2}" type="datetime1">
               <a:rPr lang="en-US" smtClean="0"/>
-              <a:t>9/16/15</a:t>
+              <a:t>9/25/16</a:t>
             </a:fld>
             <a:endParaRPr lang="en-US"/>
           </a:p>
@@ -13762,13 +13865,13 @@
   <p:clrMapOvr>
     <a:masterClrMapping/>
   </p:clrMapOvr>
-  <mc:AlternateContent xmlns:mc="http://schemas.openxmlformats.org/markup-compatibility/2006">
-    <mc:Choice xmlns:p14="http://schemas.microsoft.com/office/powerpoint/2010/main" Requires="p14">
+  <mc:AlternateContent xmlns:mc="http://schemas.openxmlformats.org/markup-compatibility/2006" xmlns:p14="http://schemas.microsoft.com/office/powerpoint/2010/main">
+    <mc:Choice Requires="p14">
       <p:transition spd="slow" p14:dur="1200">
         <p14:prism/>
       </p:transition>
     </mc:Choice>
-    <mc:Fallback>
+    <mc:Fallback xmlns="">
       <p:transition xmlns:p14="http://schemas.microsoft.com/office/powerpoint/2010/main" spd="slow">
         <p:fade/>
       </p:transition>
@@ -13909,7 +14012,7 @@
           <a:p>
             <a:fld id="{B3D78EBF-4E2C-1640-AF31-0CE1A05F27D8}" type="datetime1">
               <a:rPr lang="en-US" smtClean="0"/>
-              <a:t>9/16/15</a:t>
+              <a:t>9/25/16</a:t>
             </a:fld>
             <a:endParaRPr lang="en-US"/>
           </a:p>
@@ -13971,13 +14074,13 @@
   <p:clrMapOvr>
     <a:masterClrMapping/>
   </p:clrMapOvr>
-  <mc:AlternateContent xmlns:mc="http://schemas.openxmlformats.org/markup-compatibility/2006">
-    <mc:Choice xmlns:p14="http://schemas.microsoft.com/office/powerpoint/2010/main" Requires="p14">
+  <mc:AlternateContent xmlns:mc="http://schemas.openxmlformats.org/markup-compatibility/2006" xmlns:p14="http://schemas.microsoft.com/office/powerpoint/2010/main">
+    <mc:Choice Requires="p14">
       <p:transition spd="slow" p14:dur="1200">
         <p14:prism/>
       </p:transition>
     </mc:Choice>
-    <mc:Fallback>
+    <mc:Fallback xmlns="">
       <p:transition xmlns:p14="http://schemas.microsoft.com/office/powerpoint/2010/main" spd="slow">
         <p:fade/>
       </p:transition>
@@ -14078,7 +14181,7 @@
           <a:p>
             <a:fld id="{B9864630-B611-9748-AAD1-73FAF0B57B3E}" type="datetime1">
               <a:rPr lang="en-US" smtClean="0"/>
-              <a:t>9/16/15</a:t>
+              <a:t>9/25/16</a:t>
             </a:fld>
             <a:endParaRPr lang="en-US"/>
           </a:p>
@@ -14140,13 +14243,13 @@
   <p:clrMapOvr>
     <a:masterClrMapping/>
   </p:clrMapOvr>
-  <mc:AlternateContent xmlns:mc="http://schemas.openxmlformats.org/markup-compatibility/2006">
-    <mc:Choice xmlns:p14="http://schemas.microsoft.com/office/powerpoint/2010/main" Requires="p14">
+  <mc:AlternateContent xmlns:mc="http://schemas.openxmlformats.org/markup-compatibility/2006" xmlns:p14="http://schemas.microsoft.com/office/powerpoint/2010/main">
+    <mc:Choice Requires="p14">
       <p:transition spd="slow" p14:dur="1200">
         <p14:prism/>
       </p:transition>
     </mc:Choice>
-    <mc:Fallback>
+    <mc:Fallback xmlns="">
       <p:transition xmlns:p14="http://schemas.microsoft.com/office/powerpoint/2010/main" spd="slow">
         <p:fade/>
       </p:transition>
@@ -14392,7 +14495,7 @@
           <a:p>
             <a:fld id="{4749372C-C9DE-DD4D-BB6B-061D2178171F}" type="datetime1">
               <a:rPr lang="en-US" smtClean="0"/>
-              <a:t>9/16/15</a:t>
+              <a:t>9/25/16</a:t>
             </a:fld>
             <a:endParaRPr lang="en-US"/>
           </a:p>
@@ -14431,13 +14534,13 @@
   <p:clrMapOvr>
     <a:masterClrMapping/>
   </p:clrMapOvr>
-  <mc:AlternateContent xmlns:mc="http://schemas.openxmlformats.org/markup-compatibility/2006">
-    <mc:Choice xmlns:p14="http://schemas.microsoft.com/office/powerpoint/2010/main" Requires="p14">
+  <mc:AlternateContent xmlns:mc="http://schemas.openxmlformats.org/markup-compatibility/2006" xmlns:p14="http://schemas.microsoft.com/office/powerpoint/2010/main">
+    <mc:Choice Requires="p14">
       <p:transition spd="slow" p14:dur="1200">
         <p14:prism/>
       </p:transition>
     </mc:Choice>
-    <mc:Fallback>
+    <mc:Fallback xmlns="">
       <p:transition xmlns:p14="http://schemas.microsoft.com/office/powerpoint/2010/main" spd="slow">
         <p:fade/>
       </p:transition>
@@ -14446,7 +14549,7 @@
   <p:timing>
     <p:tnLst>
       <p:par>
-        <p:cTn xmlns:p14="http://schemas.microsoft.com/office/powerpoint/2010/main" id="1" dur="indefinite" restart="never" nodeType="tmRoot"/>
+        <p:cTn id="1" dur="indefinite" restart="never" nodeType="tmRoot"/>
       </p:par>
     </p:tnLst>
   </p:timing>
@@ -14579,7 +14682,7 @@
           <a:p>
             <a:fld id="{72CFBFCD-2E64-E14C-B43B-987CB7704BEB}" type="datetime1">
               <a:rPr lang="en-US" smtClean="0"/>
-              <a:t>9/16/15</a:t>
+              <a:t>9/25/16</a:t>
             </a:fld>
             <a:endParaRPr lang="en-US"/>
           </a:p>
@@ -14641,13 +14744,13 @@
   <p:clrMapOvr>
     <a:masterClrMapping/>
   </p:clrMapOvr>
-  <mc:AlternateContent xmlns:mc="http://schemas.openxmlformats.org/markup-compatibility/2006">
-    <mc:Choice xmlns:p14="http://schemas.microsoft.com/office/powerpoint/2010/main" Requires="p14">
+  <mc:AlternateContent xmlns:mc="http://schemas.openxmlformats.org/markup-compatibility/2006" xmlns:p14="http://schemas.microsoft.com/office/powerpoint/2010/main">
+    <mc:Choice Requires="p14">
       <p:transition spd="slow" p14:dur="1200">
         <p14:prism/>
       </p:transition>
     </mc:Choice>
-    <mc:Fallback>
+    <mc:Fallback xmlns="">
       <p:transition xmlns:p14="http://schemas.microsoft.com/office/powerpoint/2010/main" spd="slow">
         <p:fade/>
       </p:transition>
@@ -14753,7 +14856,7 @@
           <a:p>
             <a:fld id="{161E004F-FE4C-DF4B-B3F0-89173D5236B5}" type="datetime1">
               <a:rPr lang="en-US" smtClean="0"/>
-              <a:t>9/16/15</a:t>
+              <a:t>9/25/16</a:t>
             </a:fld>
             <a:endParaRPr lang="en-US"/>
           </a:p>
@@ -14815,13 +14918,13 @@
   <p:clrMapOvr>
     <a:masterClrMapping/>
   </p:clrMapOvr>
-  <mc:AlternateContent xmlns:mc="http://schemas.openxmlformats.org/markup-compatibility/2006">
-    <mc:Choice xmlns:p14="http://schemas.microsoft.com/office/powerpoint/2010/main" Requires="p14">
+  <mc:AlternateContent xmlns:mc="http://schemas.openxmlformats.org/markup-compatibility/2006" xmlns:p14="http://schemas.microsoft.com/office/powerpoint/2010/main">
+    <mc:Choice Requires="p14">
       <p:transition spd="slow" p14:dur="1200">
         <p14:prism/>
       </p:transition>
     </mc:Choice>
-    <mc:Fallback>
+    <mc:Fallback xmlns="">
       <p:transition xmlns:p14="http://schemas.microsoft.com/office/powerpoint/2010/main" spd="slow">
         <p:fade/>
       </p:transition>
@@ -14864,81 +14967,61 @@
           <a:p>
             <a:r>
               <a:rPr lang="en-US" dirty="0" smtClean="0"/>
-              <a:t>Why Are There So Many Features?</a:t>
+              <a:t>Quality (reality) triangle</a:t>
             </a:r>
             <a:endParaRPr lang="en-US" dirty="0"/>
           </a:p>
         </p:txBody>
       </p:sp>
-      <p:sp>
-        <p:nvSpPr>
-          <p:cNvPr id="3" name="Content Placeholder 2"/>
-          <p:cNvSpPr>
-            <a:spLocks noGrp="1"/>
-          </p:cNvSpPr>
+      <p:pic>
+        <p:nvPicPr>
+          <p:cNvPr id="8" name="Content Placeholder 7"/>
+          <p:cNvPicPr>
+            <a:picLocks noGrp="1" noChangeAspect="1"/>
+          </p:cNvPicPr>
           <p:nvPr>
             <p:ph idx="1"/>
           </p:nvPr>
-        </p:nvSpPr>
-        <p:spPr/>
-        <p:txBody>
-          <a:bodyPr/>
-          <a:lstStyle/>
-          <a:p>
-            <a:r>
-              <a:rPr lang="en-US" dirty="0" smtClean="0"/>
-              <a:t>Not all users want the same thing</a:t>
-            </a:r>
-          </a:p>
-          <a:p>
-            <a:pPr lvl="1"/>
-            <a:r>
-              <a:rPr lang="en-US" dirty="0" smtClean="0"/>
-              <a:t>Some are more sophisticated than others</a:t>
-            </a:r>
-          </a:p>
-          <a:p>
-            <a:r>
-              <a:rPr lang="en-US" dirty="0" smtClean="0"/>
-              <a:t>Features sell software</a:t>
-            </a:r>
-          </a:p>
-          <a:p>
-            <a:pPr lvl="1"/>
-            <a:r>
-              <a:rPr lang="en-US" dirty="0" smtClean="0"/>
-              <a:t>Well, and everything else</a:t>
-            </a:r>
-          </a:p>
-          <a:p>
-            <a:r>
-              <a:rPr lang="en-US" dirty="0" smtClean="0"/>
-              <a:t>Features may become more important over time</a:t>
-            </a:r>
+        </p:nvPicPr>
+        <p:blipFill>
+          <a:blip r:embed="rId2">
+            <a:extLst>
+              <a:ext uri="{28A0092B-C50C-407E-A947-70E740481C1C}">
+                <a14:useLocalDpi xmlns:a14="http://schemas.microsoft.com/office/drawing/2010/main" val="0"/>
+              </a:ext>
+            </a:extLst>
+          </a:blip>
+          <a:stretch>
+            <a:fillRect/>
+          </a:stretch>
+        </p:blipFill>
+        <p:spPr>
+          <a:xfrm>
+            <a:off x="1762125" y="2417263"/>
+            <a:ext cx="5619750" cy="2809875"/>
+          </a:xfrm>
+        </p:spPr>
+      </p:pic>
+      <p:sp>
+        <p:nvSpPr>
+          <p:cNvPr id="4" name="Date Placeholder 3"/>
+          <p:cNvSpPr>
+            <a:spLocks noGrp="1"/>
+          </p:cNvSpPr>
+          <p:nvPr>
+            <p:ph type="dt" sz="half" idx="10"/>
+          </p:nvPr>
+        </p:nvSpPr>
+        <p:spPr/>
+        <p:txBody>
+          <a:bodyPr/>
+          <a:lstStyle/>
+          <a:p>
+            <a:fld id="{917F1E21-2D58-744F-BB16-49ADF20D8AC4}" type="datetime1">
+              <a:rPr lang="en-US" smtClean="0"/>
+              <a:t>9/25/16</a:t>
+            </a:fld>
             <a:endParaRPr lang="en-US" dirty="0"/>
-          </a:p>
-        </p:txBody>
-      </p:sp>
-      <p:sp>
-        <p:nvSpPr>
-          <p:cNvPr id="4" name="Date Placeholder 3"/>
-          <p:cNvSpPr>
-            <a:spLocks noGrp="1"/>
-          </p:cNvSpPr>
-          <p:nvPr>
-            <p:ph type="dt" sz="half" idx="10"/>
-          </p:nvPr>
-        </p:nvSpPr>
-        <p:spPr/>
-        <p:txBody>
-          <a:bodyPr/>
-          <a:lstStyle/>
-          <a:p>
-            <a:fld id="{0A0C3798-89CD-9B47-8F92-9D62F9B0EFC7}" type="datetime1">
-              <a:rPr lang="en-US" smtClean="0"/>
-              <a:t>9/16/15</a:t>
-            </a:fld>
-            <a:endParaRPr lang="en-US"/>
           </a:p>
         </p:txBody>
       </p:sp>
@@ -14991,25 +15074,13 @@
     </p:spTree>
     <p:extLst>
       <p:ext uri="{BB962C8B-B14F-4D97-AF65-F5344CB8AC3E}">
-        <p14:creationId xmlns:p14="http://schemas.microsoft.com/office/powerpoint/2010/main" val="1278161379"/>
+        <p14:creationId xmlns:p14="http://schemas.microsoft.com/office/powerpoint/2010/main" val="1291130921"/>
       </p:ext>
     </p:extLst>
   </p:cSld>
   <p:clrMapOvr>
     <a:masterClrMapping/>
   </p:clrMapOvr>
-  <mc:AlternateContent xmlns:mc="http://schemas.openxmlformats.org/markup-compatibility/2006">
-    <mc:Choice xmlns:p14="http://schemas.microsoft.com/office/powerpoint/2010/main" Requires="p14">
-      <p:transition spd="slow" p14:dur="1200">
-        <p14:prism/>
-      </p:transition>
-    </mc:Choice>
-    <mc:Fallback>
-      <p:transition xmlns:p14="http://schemas.microsoft.com/office/powerpoint/2010/main" spd="slow">
-        <p:fade/>
-      </p:transition>
-    </mc:Fallback>
-  </mc:AlternateContent>
 </p:sld>
 </file>
 
@@ -15047,7 +15118,7 @@
           <a:p>
             <a:r>
               <a:rPr lang="en-US" dirty="0" smtClean="0"/>
-              <a:t>Updates and Upgrades</a:t>
+              <a:t>Why Are There So Many Features?</a:t>
             </a:r>
             <a:endParaRPr lang="en-US" dirty="0"/>
           </a:p>
@@ -15070,46 +15141,33 @@
           <a:p>
             <a:r>
               <a:rPr lang="en-US" dirty="0" smtClean="0"/>
-              <a:t>It’s now cheap to do</a:t>
+              <a:t>Not all users want the same thing</a:t>
             </a:r>
           </a:p>
           <a:p>
             <a:pPr lvl="1"/>
             <a:r>
               <a:rPr lang="en-US" dirty="0" smtClean="0"/>
-              <a:t>Internet vs. creating media</a:t>
-            </a:r>
-          </a:p>
-          <a:p>
-            <a:r>
-              <a:rPr lang="en-US" dirty="0" smtClean="0"/>
-              <a:t>Fix bugs</a:t>
-            </a:r>
-          </a:p>
-          <a:p>
-            <a:r>
-              <a:rPr lang="en-US" dirty="0" smtClean="0"/>
-              <a:t>Add features</a:t>
+              <a:t>Some are more sophisticated than others</a:t>
+            </a:r>
+          </a:p>
+          <a:p>
+            <a:r>
+              <a:rPr lang="en-US" dirty="0" smtClean="0"/>
+              <a:t>Features sell software</a:t>
             </a:r>
           </a:p>
           <a:p>
             <a:pPr lvl="1"/>
             <a:r>
               <a:rPr lang="en-US" dirty="0" smtClean="0"/>
-              <a:t>More sales</a:t>
-            </a:r>
-          </a:p>
-          <a:p>
-            <a:r>
-              <a:rPr lang="en-US" dirty="0" smtClean="0"/>
-              <a:t>Upgrades more significant</a:t>
-            </a:r>
-          </a:p>
-          <a:p>
-            <a:pPr lvl="1"/>
-            <a:r>
-              <a:rPr lang="en-US" dirty="0" smtClean="0"/>
-              <a:t>OS</a:t>
+              <a:t>Well, and everything else</a:t>
+            </a:r>
+          </a:p>
+          <a:p>
+            <a:r>
+              <a:rPr lang="en-US" dirty="0" smtClean="0"/>
+              <a:t>Features may become more important over time</a:t>
             </a:r>
             <a:endParaRPr lang="en-US" dirty="0"/>
           </a:p>
@@ -15130,9 +15188,9 @@
           <a:bodyPr/>
           <a:lstStyle/>
           <a:p>
-            <a:fld id="{74B44B85-1548-2A46-BC80-BFC0B07A8824}" type="datetime1">
-              <a:rPr lang="en-US" smtClean="0"/>
-              <a:t>9/16/15</a:t>
+            <a:fld id="{0A0C3798-89CD-9B47-8F92-9D62F9B0EFC7}" type="datetime1">
+              <a:rPr lang="en-US" smtClean="0"/>
+              <a:t>9/25/16</a:t>
             </a:fld>
             <a:endParaRPr lang="en-US"/>
           </a:p>
@@ -15187,20 +15245,20 @@
     </p:spTree>
     <p:extLst>
       <p:ext uri="{BB962C8B-B14F-4D97-AF65-F5344CB8AC3E}">
-        <p14:creationId xmlns:p14="http://schemas.microsoft.com/office/powerpoint/2010/main" val="624766866"/>
+        <p14:creationId xmlns:p14="http://schemas.microsoft.com/office/powerpoint/2010/main" val="1278161379"/>
       </p:ext>
     </p:extLst>
   </p:cSld>
   <p:clrMapOvr>
     <a:masterClrMapping/>
   </p:clrMapOvr>
-  <mc:AlternateContent xmlns:mc="http://schemas.openxmlformats.org/markup-compatibility/2006">
-    <mc:Choice xmlns:p14="http://schemas.microsoft.com/office/powerpoint/2010/main" Requires="p14">
+  <mc:AlternateContent xmlns:mc="http://schemas.openxmlformats.org/markup-compatibility/2006" xmlns:p14="http://schemas.microsoft.com/office/powerpoint/2010/main">
+    <mc:Choice Requires="p14">
       <p:transition spd="slow" p14:dur="1200">
         <p14:prism/>
       </p:transition>
     </mc:Choice>
-    <mc:Fallback>
+    <mc:Fallback xmlns="">
       <p:transition xmlns:p14="http://schemas.microsoft.com/office/powerpoint/2010/main" spd="slow">
         <p:fade/>
       </p:transition>
@@ -15266,48 +15324,48 @@
           <a:p>
             <a:r>
               <a:rPr lang="en-US" dirty="0" smtClean="0"/>
-              <a:t>Moving to a subscription model</a:t>
+              <a:t>It’s now cheap to do</a:t>
             </a:r>
           </a:p>
           <a:p>
             <a:pPr lvl="1"/>
             <a:r>
               <a:rPr lang="en-US" dirty="0" smtClean="0"/>
-              <a:t>Some number of updates included in price</a:t>
+              <a:t>Internet vs. creating media</a:t>
+            </a:r>
+          </a:p>
+          <a:p>
+            <a:r>
+              <a:rPr lang="en-US" dirty="0" smtClean="0"/>
+              <a:t>Fix bugs</a:t>
+            </a:r>
+          </a:p>
+          <a:p>
+            <a:r>
+              <a:rPr lang="en-US" dirty="0" smtClean="0"/>
+              <a:t>Add features</a:t>
             </a:r>
           </a:p>
           <a:p>
             <a:pPr lvl="1"/>
             <a:r>
               <a:rPr lang="en-US" dirty="0" smtClean="0"/>
-              <a:t>Version upgrade might cost</a:t>
+              <a:t>More sales</a:t>
+            </a:r>
+          </a:p>
+          <a:p>
+            <a:r>
+              <a:rPr lang="en-US" dirty="0" smtClean="0"/>
+              <a:t>Upgrades more significant</a:t>
             </a:r>
           </a:p>
           <a:p>
             <a:pPr lvl="1"/>
             <a:r>
               <a:rPr lang="en-US" dirty="0" smtClean="0"/>
-              <a:t>Old versions stopped being supported</a:t>
-            </a:r>
-          </a:p>
-          <a:p>
-            <a:r>
-              <a:rPr lang="en-US" dirty="0" smtClean="0"/>
-              <a:t>Moving to ad-based software</a:t>
-            </a:r>
-          </a:p>
-          <a:p>
-            <a:r>
-              <a:rPr lang="en-US" dirty="0" smtClean="0"/>
-              <a:t>Upgrades often contentious</a:t>
-            </a:r>
-          </a:p>
-          <a:p>
-            <a:pPr lvl="1"/>
-            <a:r>
-              <a:rPr lang="en-US" dirty="0" smtClean="0"/>
-              <a:t>W8, Office bar, etc.</a:t>
-            </a:r>
+              <a:t>OS</a:t>
+            </a:r>
+            <a:endParaRPr lang="en-US" dirty="0"/>
           </a:p>
         </p:txBody>
       </p:sp>
@@ -15326,9 +15384,9 @@
           <a:bodyPr/>
           <a:lstStyle/>
           <a:p>
-            <a:fld id="{DC1EBB16-DDBD-BD4D-BE62-39036B1706EA}" type="datetime1">
-              <a:rPr lang="en-US" smtClean="0"/>
-              <a:t>9/16/15</a:t>
+            <a:fld id="{74B44B85-1548-2A46-BC80-BFC0B07A8824}" type="datetime1">
+              <a:rPr lang="en-US" smtClean="0"/>
+              <a:t>9/25/16</a:t>
             </a:fld>
             <a:endParaRPr lang="en-US"/>
           </a:p>
@@ -15383,20 +15441,20 @@
     </p:spTree>
     <p:extLst>
       <p:ext uri="{BB962C8B-B14F-4D97-AF65-F5344CB8AC3E}">
-        <p14:creationId xmlns:p14="http://schemas.microsoft.com/office/powerpoint/2010/main" val="2055656503"/>
+        <p14:creationId xmlns:p14="http://schemas.microsoft.com/office/powerpoint/2010/main" val="624766866"/>
       </p:ext>
     </p:extLst>
   </p:cSld>
   <p:clrMapOvr>
     <a:masterClrMapping/>
   </p:clrMapOvr>
-  <mc:AlternateContent xmlns:mc="http://schemas.openxmlformats.org/markup-compatibility/2006">
-    <mc:Choice xmlns:p14="http://schemas.microsoft.com/office/powerpoint/2010/main" Requires="p14">
+  <mc:AlternateContent xmlns:mc="http://schemas.openxmlformats.org/markup-compatibility/2006" xmlns:p14="http://schemas.microsoft.com/office/powerpoint/2010/main">
+    <mc:Choice Requires="p14">
       <p:transition spd="slow" p14:dur="1200">
         <p14:prism/>
       </p:transition>
     </mc:Choice>
-    <mc:Fallback>
+    <mc:Fallback xmlns="">
       <p:transition xmlns:p14="http://schemas.microsoft.com/office/powerpoint/2010/main" spd="slow">
         <p:fade/>
       </p:transition>
@@ -15439,7 +15497,7 @@
           <a:p>
             <a:r>
               <a:rPr lang="en-US" dirty="0" smtClean="0"/>
-              <a:t>Motivations</a:t>
+              <a:t>Updates and Upgrades</a:t>
             </a:r>
             <a:endParaRPr lang="en-US" dirty="0"/>
           </a:p>
@@ -15462,39 +15520,48 @@
           <a:p>
             <a:r>
               <a:rPr lang="en-US" dirty="0" smtClean="0"/>
-              <a:t>Security patches</a:t>
-            </a:r>
-          </a:p>
-          <a:p>
-            <a:r>
-              <a:rPr lang="en-US" dirty="0" smtClean="0"/>
-              <a:t>Other fixes</a:t>
-            </a:r>
-          </a:p>
-          <a:p>
-            <a:r>
-              <a:rPr lang="en-US" dirty="0" smtClean="0"/>
-              <a:t>Better functionality</a:t>
-            </a:r>
-          </a:p>
-          <a:p>
-            <a:r>
-              <a:rPr lang="en-US" dirty="0" smtClean="0"/>
-              <a:t>User needs change</a:t>
-            </a:r>
-          </a:p>
-          <a:p>
-            <a:r>
-              <a:rPr lang="en-US" dirty="0" smtClean="0"/>
-              <a:t>Releases get press</a:t>
-            </a:r>
-          </a:p>
-          <a:p>
-            <a:r>
-              <a:rPr lang="en-US" dirty="0" smtClean="0"/>
-              <a:t>Keep up with competitors</a:t>
-            </a:r>
-            <a:endParaRPr lang="en-US" dirty="0"/>
+              <a:t>Moving to a subscription model</a:t>
+            </a:r>
+          </a:p>
+          <a:p>
+            <a:pPr lvl="1"/>
+            <a:r>
+              <a:rPr lang="en-US" dirty="0" smtClean="0"/>
+              <a:t>Some number of updates included in price</a:t>
+            </a:r>
+          </a:p>
+          <a:p>
+            <a:pPr lvl="1"/>
+            <a:r>
+              <a:rPr lang="en-US" dirty="0" smtClean="0"/>
+              <a:t>Version upgrade might cost</a:t>
+            </a:r>
+          </a:p>
+          <a:p>
+            <a:pPr lvl="1"/>
+            <a:r>
+              <a:rPr lang="en-US" dirty="0" smtClean="0"/>
+              <a:t>Old versions stopped being supported</a:t>
+            </a:r>
+          </a:p>
+          <a:p>
+            <a:r>
+              <a:rPr lang="en-US" dirty="0" smtClean="0"/>
+              <a:t>Moving to ad-based software</a:t>
+            </a:r>
+          </a:p>
+          <a:p>
+            <a:r>
+              <a:rPr lang="en-US" dirty="0" smtClean="0"/>
+              <a:t>Upgrades often contentious</a:t>
+            </a:r>
+          </a:p>
+          <a:p>
+            <a:pPr lvl="1"/>
+            <a:r>
+              <a:rPr lang="en-US" dirty="0" smtClean="0"/>
+              <a:t>W8, Office bar, etc.</a:t>
+            </a:r>
           </a:p>
         </p:txBody>
       </p:sp>
@@ -15513,9 +15580,9 @@
           <a:bodyPr/>
           <a:lstStyle/>
           <a:p>
-            <a:fld id="{4094CCDA-AA58-F644-B9CB-2D054C253979}" type="datetime1">
-              <a:rPr lang="en-US" smtClean="0"/>
-              <a:t>9/16/15</a:t>
+            <a:fld id="{DC1EBB16-DDBD-BD4D-BE62-39036B1706EA}" type="datetime1">
+              <a:rPr lang="en-US" smtClean="0"/>
+              <a:t>9/25/16</a:t>
             </a:fld>
             <a:endParaRPr lang="en-US"/>
           </a:p>
@@ -15570,32 +15637,25 @@
     </p:spTree>
     <p:extLst>
       <p:ext uri="{BB962C8B-B14F-4D97-AF65-F5344CB8AC3E}">
-        <p14:creationId xmlns:p14="http://schemas.microsoft.com/office/powerpoint/2010/main" val="2456522434"/>
+        <p14:creationId xmlns:p14="http://schemas.microsoft.com/office/powerpoint/2010/main" val="2055656503"/>
       </p:ext>
     </p:extLst>
   </p:cSld>
   <p:clrMapOvr>
     <a:masterClrMapping/>
   </p:clrMapOvr>
-  <mc:AlternateContent xmlns:mc="http://schemas.openxmlformats.org/markup-compatibility/2006">
-    <mc:Choice xmlns:p14="http://schemas.microsoft.com/office/powerpoint/2010/main" Requires="p14">
+  <mc:AlternateContent xmlns:mc="http://schemas.openxmlformats.org/markup-compatibility/2006" xmlns:p14="http://schemas.microsoft.com/office/powerpoint/2010/main">
+    <mc:Choice Requires="p14">
       <p:transition spd="slow" p14:dur="1200">
         <p14:prism/>
       </p:transition>
     </mc:Choice>
-    <mc:Fallback>
+    <mc:Fallback xmlns="">
       <p:transition xmlns:p14="http://schemas.microsoft.com/office/powerpoint/2010/main" spd="slow">
         <p:fade/>
       </p:transition>
     </mc:Fallback>
   </mc:AlternateContent>
-  <p:timing>
-    <p:tnLst>
-      <p:par>
-        <p:cTn xmlns:p14="http://schemas.microsoft.com/office/powerpoint/2010/main" id="1" dur="indefinite" restart="never" nodeType="tmRoot"/>
-      </p:par>
-    </p:tnLst>
-  </p:timing>
 </p:sld>
 </file>
 
@@ -15633,7 +15693,7 @@
           <a:p>
             <a:r>
               <a:rPr lang="en-US" dirty="0" smtClean="0"/>
-              <a:t>Release Cycles</a:t>
+              <a:t>Motivations</a:t>
             </a:r>
             <a:endParaRPr lang="en-US" dirty="0"/>
           </a:p>
@@ -15656,25 +15716,37 @@
           <a:p>
             <a:r>
               <a:rPr lang="en-US" dirty="0" smtClean="0"/>
-              <a:t>More often is typically better</a:t>
-            </a:r>
-          </a:p>
-          <a:p>
-            <a:r>
-              <a:rPr lang="en-US" dirty="0" smtClean="0"/>
-              <a:t>New features available sooner</a:t>
-            </a:r>
-          </a:p>
-          <a:p>
-            <a:r>
-              <a:rPr lang="en-US" dirty="0" smtClean="0"/>
-              <a:t>One might delay a month or so for others to find bugs</a:t>
-            </a:r>
-          </a:p>
-          <a:p>
-            <a:r>
-              <a:rPr lang="en-US" dirty="0" smtClean="0"/>
-              <a:t>Don’t upgrade when you really need your computer</a:t>
+              <a:t>Security patches</a:t>
+            </a:r>
+          </a:p>
+          <a:p>
+            <a:r>
+              <a:rPr lang="en-US" dirty="0" smtClean="0"/>
+              <a:t>Other fixes</a:t>
+            </a:r>
+          </a:p>
+          <a:p>
+            <a:r>
+              <a:rPr lang="en-US" dirty="0" smtClean="0"/>
+              <a:t>Better functionality</a:t>
+            </a:r>
+          </a:p>
+          <a:p>
+            <a:r>
+              <a:rPr lang="en-US" dirty="0" smtClean="0"/>
+              <a:t>User needs change</a:t>
+            </a:r>
+          </a:p>
+          <a:p>
+            <a:r>
+              <a:rPr lang="en-US" dirty="0" smtClean="0"/>
+              <a:t>Releases get press</a:t>
+            </a:r>
+          </a:p>
+          <a:p>
+            <a:r>
+              <a:rPr lang="en-US" dirty="0" smtClean="0"/>
+              <a:t>Keep up with competitors</a:t>
             </a:r>
             <a:endParaRPr lang="en-US" dirty="0"/>
           </a:p>
@@ -15695,9 +15767,9 @@
           <a:bodyPr/>
           <a:lstStyle/>
           <a:p>
-            <a:fld id="{8AFF8484-E959-0249-A025-D65408BEE8D2}" type="datetime1">
-              <a:rPr lang="en-US" smtClean="0"/>
-              <a:t>9/16/15</a:t>
+            <a:fld id="{4094CCDA-AA58-F644-B9CB-2D054C253979}" type="datetime1">
+              <a:rPr lang="en-US" smtClean="0"/>
+              <a:t>9/25/16</a:t>
             </a:fld>
             <a:endParaRPr lang="en-US"/>
           </a:p>
@@ -15752,20 +15824,20 @@
     </p:spTree>
     <p:extLst>
       <p:ext uri="{BB962C8B-B14F-4D97-AF65-F5344CB8AC3E}">
-        <p14:creationId xmlns:p14="http://schemas.microsoft.com/office/powerpoint/2010/main" val="562162739"/>
+        <p14:creationId xmlns:p14="http://schemas.microsoft.com/office/powerpoint/2010/main" val="2456522434"/>
       </p:ext>
     </p:extLst>
   </p:cSld>
   <p:clrMapOvr>
     <a:masterClrMapping/>
   </p:clrMapOvr>
-  <mc:AlternateContent xmlns:mc="http://schemas.openxmlformats.org/markup-compatibility/2006">
-    <mc:Choice xmlns:p14="http://schemas.microsoft.com/office/powerpoint/2010/main" Requires="p14">
+  <mc:AlternateContent xmlns:mc="http://schemas.openxmlformats.org/markup-compatibility/2006" xmlns:p14="http://schemas.microsoft.com/office/powerpoint/2010/main">
+    <mc:Choice Requires="p14">
       <p:transition spd="slow" p14:dur="1200">
         <p14:prism/>
       </p:transition>
     </mc:Choice>
-    <mc:Fallback>
+    <mc:Fallback xmlns="">
       <p:transition xmlns:p14="http://schemas.microsoft.com/office/powerpoint/2010/main" spd="slow">
         <p:fade/>
       </p:transition>
@@ -15774,7 +15846,7 @@
   <p:timing>
     <p:tnLst>
       <p:par>
-        <p:cTn xmlns:p14="http://schemas.microsoft.com/office/powerpoint/2010/main" id="1" dur="indefinite" restart="never" nodeType="tmRoot"/>
+        <p:cTn id="1" dur="indefinite" restart="never" nodeType="tmRoot"/>
       </p:par>
     </p:tnLst>
   </p:timing>
@@ -15815,7 +15887,7 @@
           <a:p>
             <a:r>
               <a:rPr lang="en-US" dirty="0" smtClean="0"/>
-              <a:t>Source of Bugs</a:t>
+              <a:t>Release Cycles</a:t>
             </a:r>
             <a:endParaRPr lang="en-US" dirty="0"/>
           </a:p>
@@ -15838,39 +15910,25 @@
           <a:p>
             <a:r>
               <a:rPr lang="en-US" dirty="0" smtClean="0"/>
-              <a:t>Not understanding problem</a:t>
-            </a:r>
-          </a:p>
-          <a:p>
-            <a:r>
-              <a:rPr lang="en-US" dirty="0" smtClean="0"/>
-              <a:t>Not understanding code</a:t>
-            </a:r>
-          </a:p>
-          <a:p>
-            <a:r>
-              <a:rPr lang="en-US" dirty="0" smtClean="0"/>
-              <a:t>Not testing all possibilities</a:t>
-            </a:r>
-          </a:p>
-          <a:p>
-            <a:pPr lvl="1"/>
-            <a:r>
-              <a:rPr lang="en-US" dirty="0" smtClean="0"/>
-              <a:t>There are typically a huge number of possible executions</a:t>
-            </a:r>
-          </a:p>
-          <a:p>
-            <a:r>
-              <a:rPr lang="en-US" dirty="0" smtClean="0"/>
-              <a:t>Interactions in and between programs</a:t>
-            </a:r>
-          </a:p>
-          <a:p>
-            <a:pPr lvl="1"/>
-            <a:r>
-              <a:rPr lang="en-US" dirty="0" smtClean="0"/>
-              <a:t>Threads, timing attacks</a:t>
+              <a:t>More often is typically better</a:t>
+            </a:r>
+          </a:p>
+          <a:p>
+            <a:r>
+              <a:rPr lang="en-US" dirty="0" smtClean="0"/>
+              <a:t>New features available sooner</a:t>
+            </a:r>
+          </a:p>
+          <a:p>
+            <a:r>
+              <a:rPr lang="en-US" dirty="0" smtClean="0"/>
+              <a:t>One might delay a month or so for others to find bugs</a:t>
+            </a:r>
+          </a:p>
+          <a:p>
+            <a:r>
+              <a:rPr lang="en-US" dirty="0" smtClean="0"/>
+              <a:t>Don’t upgrade when you really need your computer</a:t>
             </a:r>
             <a:endParaRPr lang="en-US" dirty="0"/>
           </a:p>
@@ -15891,9 +15949,9 @@
           <a:bodyPr/>
           <a:lstStyle/>
           <a:p>
-            <a:fld id="{8A935258-EE06-0C40-90F7-60C02B100E58}" type="datetime1">
-              <a:rPr lang="en-US" smtClean="0"/>
-              <a:t>9/16/15</a:t>
+            <a:fld id="{8AFF8484-E959-0249-A025-D65408BEE8D2}" type="datetime1">
+              <a:rPr lang="en-US" smtClean="0"/>
+              <a:t>9/25/16</a:t>
             </a:fld>
             <a:endParaRPr lang="en-US"/>
           </a:p>
@@ -15948,25 +16006,32 @@
     </p:spTree>
     <p:extLst>
       <p:ext uri="{BB962C8B-B14F-4D97-AF65-F5344CB8AC3E}">
-        <p14:creationId xmlns:p14="http://schemas.microsoft.com/office/powerpoint/2010/main" val="2731860591"/>
+        <p14:creationId xmlns:p14="http://schemas.microsoft.com/office/powerpoint/2010/main" val="562162739"/>
       </p:ext>
     </p:extLst>
   </p:cSld>
   <p:clrMapOvr>
     <a:masterClrMapping/>
   </p:clrMapOvr>
-  <mc:AlternateContent xmlns:mc="http://schemas.openxmlformats.org/markup-compatibility/2006">
-    <mc:Choice xmlns:p14="http://schemas.microsoft.com/office/powerpoint/2010/main" Requires="p14">
+  <mc:AlternateContent xmlns:mc="http://schemas.openxmlformats.org/markup-compatibility/2006" xmlns:p14="http://schemas.microsoft.com/office/powerpoint/2010/main">
+    <mc:Choice Requires="p14">
       <p:transition spd="slow" p14:dur="1200">
         <p14:prism/>
       </p:transition>
     </mc:Choice>
-    <mc:Fallback>
+    <mc:Fallback xmlns="">
       <p:transition xmlns:p14="http://schemas.microsoft.com/office/powerpoint/2010/main" spd="slow">
         <p:fade/>
       </p:transition>
     </mc:Fallback>
   </mc:AlternateContent>
+  <p:timing>
+    <p:tnLst>
+      <p:par>
+        <p:cTn id="1" dur="indefinite" restart="never" nodeType="tmRoot"/>
+      </p:par>
+    </p:tnLst>
+  </p:timing>
 </p:sld>
 </file>
 
@@ -16004,7 +16069,7 @@
           <a:p>
             <a:r>
               <a:rPr lang="en-US" dirty="0" smtClean="0"/>
-              <a:t>Jobs</a:t>
+              <a:t>Source of Bugs</a:t>
             </a:r>
             <a:endParaRPr lang="en-US" dirty="0"/>
           </a:p>
@@ -16027,28 +16092,40 @@
           <a:p>
             <a:r>
               <a:rPr lang="en-US" dirty="0" smtClean="0"/>
-              <a:t>Software engineer</a:t>
-            </a:r>
-          </a:p>
-          <a:p>
-            <a:r>
-              <a:rPr lang="en-US" dirty="0" smtClean="0"/>
-              <a:t>Quality Assurance/tester</a:t>
-            </a:r>
-          </a:p>
-          <a:p>
-            <a:r>
-              <a:rPr lang="en-US" dirty="0" smtClean="0"/>
-              <a:t>User interface/experience</a:t>
-            </a:r>
-          </a:p>
-          <a:p>
-            <a:r>
-              <a:rPr lang="en-US" dirty="0" smtClean="0"/>
-              <a:t>Systems analyst</a:t>
-            </a:r>
-          </a:p>
-          <a:p>
+              <a:t>Not understanding problem</a:t>
+            </a:r>
+          </a:p>
+          <a:p>
+            <a:r>
+              <a:rPr lang="en-US" dirty="0" smtClean="0"/>
+              <a:t>Not understanding code</a:t>
+            </a:r>
+          </a:p>
+          <a:p>
+            <a:r>
+              <a:rPr lang="en-US" dirty="0" smtClean="0"/>
+              <a:t>Not testing all possibilities</a:t>
+            </a:r>
+          </a:p>
+          <a:p>
+            <a:pPr lvl="1"/>
+            <a:r>
+              <a:rPr lang="en-US" dirty="0" smtClean="0"/>
+              <a:t>There are typically a huge number of possible executions</a:t>
+            </a:r>
+          </a:p>
+          <a:p>
+            <a:r>
+              <a:rPr lang="en-US" dirty="0" smtClean="0"/>
+              <a:t>Interactions in and between programs</a:t>
+            </a:r>
+          </a:p>
+          <a:p>
+            <a:pPr lvl="1"/>
+            <a:r>
+              <a:rPr lang="en-US" dirty="0" smtClean="0"/>
+              <a:t>Threads, timing attacks</a:t>
+            </a:r>
             <a:endParaRPr lang="en-US" dirty="0"/>
           </a:p>
         </p:txBody>
@@ -16068,9 +16145,9 @@
           <a:bodyPr/>
           <a:lstStyle/>
           <a:p>
-            <a:fld id="{C1E96F25-F392-FE4B-A9AE-8D7AE0D529FD}" type="datetime1">
-              <a:rPr lang="en-US" smtClean="0"/>
-              <a:t>9/16/15</a:t>
+            <a:fld id="{8A935258-EE06-0C40-90F7-60C02B100E58}" type="datetime1">
+              <a:rPr lang="en-US" smtClean="0"/>
+              <a:t>9/25/16</a:t>
             </a:fld>
             <a:endParaRPr lang="en-US"/>
           </a:p>
@@ -16125,20 +16202,20 @@
     </p:spTree>
     <p:extLst>
       <p:ext uri="{BB962C8B-B14F-4D97-AF65-F5344CB8AC3E}">
-        <p14:creationId xmlns:p14="http://schemas.microsoft.com/office/powerpoint/2010/main" val="2153335625"/>
+        <p14:creationId xmlns:p14="http://schemas.microsoft.com/office/powerpoint/2010/main" val="2731860591"/>
       </p:ext>
     </p:extLst>
   </p:cSld>
   <p:clrMapOvr>
     <a:masterClrMapping/>
   </p:clrMapOvr>
-  <mc:AlternateContent xmlns:mc="http://schemas.openxmlformats.org/markup-compatibility/2006">
-    <mc:Choice xmlns:p14="http://schemas.microsoft.com/office/powerpoint/2010/main" Requires="p14">
+  <mc:AlternateContent xmlns:mc="http://schemas.openxmlformats.org/markup-compatibility/2006" xmlns:p14="http://schemas.microsoft.com/office/powerpoint/2010/main">
+    <mc:Choice Requires="p14">
       <p:transition spd="slow" p14:dur="1200">
         <p14:prism/>
       </p:transition>
     </mc:Choice>
-    <mc:Fallback>
+    <mc:Fallback xmlns="">
       <p:transition xmlns:p14="http://schemas.microsoft.com/office/powerpoint/2010/main" spd="slow">
         <p:fade/>
       </p:transition>
@@ -16204,26 +16281,28 @@
           <a:p>
             <a:r>
               <a:rPr lang="en-US" dirty="0" smtClean="0"/>
-              <a:t>Very few solitary programmers</a:t>
-            </a:r>
-          </a:p>
-          <a:p>
-            <a:r>
-              <a:rPr lang="en-US" dirty="0" smtClean="0"/>
-              <a:t>Programs too big</a:t>
-            </a:r>
-          </a:p>
-          <a:p>
-            <a:r>
-              <a:rPr lang="en-US" dirty="0" smtClean="0"/>
-              <a:t>Teamwork has become a primary task</a:t>
-            </a:r>
-          </a:p>
-          <a:p>
-            <a:r>
-              <a:rPr lang="en-US" dirty="0" smtClean="0"/>
-              <a:t>Need excellent communication skills</a:t>
-            </a:r>
+              <a:t>Software engineer</a:t>
+            </a:r>
+          </a:p>
+          <a:p>
+            <a:r>
+              <a:rPr lang="en-US" dirty="0" smtClean="0"/>
+              <a:t>Quality Assurance/tester</a:t>
+            </a:r>
+          </a:p>
+          <a:p>
+            <a:r>
+              <a:rPr lang="en-US" dirty="0" smtClean="0"/>
+              <a:t>User interface/experience</a:t>
+            </a:r>
+          </a:p>
+          <a:p>
+            <a:r>
+              <a:rPr lang="en-US" dirty="0" smtClean="0"/>
+              <a:t>Systems analyst</a:t>
+            </a:r>
+          </a:p>
+          <a:p>
             <a:endParaRPr lang="en-US" dirty="0"/>
           </a:p>
         </p:txBody>
@@ -16243,9 +16322,9 @@
           <a:bodyPr/>
           <a:lstStyle/>
           <a:p>
-            <a:fld id="{EF3DD34D-3454-7F43-BC96-142603FFD52B}" type="datetime1">
-              <a:rPr lang="en-US" smtClean="0"/>
-              <a:t>9/16/15</a:t>
+            <a:fld id="{C1E96F25-F392-FE4B-A9AE-8D7AE0D529FD}" type="datetime1">
+              <a:rPr lang="en-US" smtClean="0"/>
+              <a:t>9/25/16</a:t>
             </a:fld>
             <a:endParaRPr lang="en-US"/>
           </a:p>
@@ -16300,20 +16379,20 @@
     </p:spTree>
     <p:extLst>
       <p:ext uri="{BB962C8B-B14F-4D97-AF65-F5344CB8AC3E}">
-        <p14:creationId xmlns:p14="http://schemas.microsoft.com/office/powerpoint/2010/main" val="3301862862"/>
+        <p14:creationId xmlns:p14="http://schemas.microsoft.com/office/powerpoint/2010/main" val="2153335625"/>
       </p:ext>
     </p:extLst>
   </p:cSld>
   <p:clrMapOvr>
     <a:masterClrMapping/>
   </p:clrMapOvr>
-  <mc:AlternateContent xmlns:mc="http://schemas.openxmlformats.org/markup-compatibility/2006">
-    <mc:Choice xmlns:p14="http://schemas.microsoft.com/office/powerpoint/2010/main" Requires="p14">
+  <mc:AlternateContent xmlns:mc="http://schemas.openxmlformats.org/markup-compatibility/2006" xmlns:p14="http://schemas.microsoft.com/office/powerpoint/2010/main">
+    <mc:Choice Requires="p14">
       <p:transition spd="slow" p14:dur="1200">
         <p14:prism/>
       </p:transition>
     </mc:Choice>
-    <mc:Fallback>
+    <mc:Fallback xmlns="">
       <p:transition xmlns:p14="http://schemas.microsoft.com/office/powerpoint/2010/main" spd="slow">
         <p:fade/>
       </p:transition>
@@ -16522,7 +16601,7 @@
           <a:p>
             <a:fld id="{E7E606D6-2C5F-6C4A-9F32-F70FE9583D1F}" type="datetime1">
               <a:rPr lang="en-US" smtClean="0"/>
-              <a:t>9/16/15</a:t>
+              <a:t>9/25/16</a:t>
             </a:fld>
             <a:endParaRPr lang="en-US"/>
           </a:p>
@@ -16561,13 +16640,13 @@
   <p:clrMapOvr>
     <a:masterClrMapping/>
   </p:clrMapOvr>
-  <mc:AlternateContent xmlns:mc="http://schemas.openxmlformats.org/markup-compatibility/2006">
-    <mc:Choice xmlns:p14="http://schemas.microsoft.com/office/powerpoint/2010/main" Requires="p14">
+  <mc:AlternateContent xmlns:mc="http://schemas.openxmlformats.org/markup-compatibility/2006" xmlns:p14="http://schemas.microsoft.com/office/powerpoint/2010/main">
+    <mc:Choice Requires="p14">
       <p:transition spd="slow" p14:dur="1200">
         <p14:prism/>
       </p:transition>
     </mc:Choice>
-    <mc:Fallback>
+    <mc:Fallback xmlns="">
       <p:transition xmlns:p14="http://schemas.microsoft.com/office/powerpoint/2010/main" spd="slow">
         <p:fade/>
       </p:transition>
@@ -16576,7 +16655,7 @@
   <p:timing>
     <p:tnLst>
       <p:par>
-        <p:cTn xmlns:p14="http://schemas.microsoft.com/office/powerpoint/2010/main" id="1" dur="indefinite" restart="never" nodeType="tmRoot"/>
+        <p:cTn id="1" dur="indefinite" restart="never" nodeType="tmRoot"/>
       </p:par>
     </p:tnLst>
   </p:timing>
@@ -16617,7 +16696,7 @@
           <a:p>
             <a:r>
               <a:rPr lang="en-US" dirty="0" smtClean="0"/>
-              <a:t>Types of Software Licenses</a:t>
+              <a:t>Jobs</a:t>
             </a:r>
             <a:endParaRPr lang="en-US" dirty="0"/>
           </a:p>
@@ -16640,46 +16719,33 @@
           <a:p>
             <a:r>
               <a:rPr lang="en-US" dirty="0" smtClean="0"/>
-              <a:t>Proprietary</a:t>
-            </a:r>
-          </a:p>
-          <a:p>
-            <a:pPr lvl="1"/>
-            <a:r>
-              <a:rPr lang="en-US" dirty="0" smtClean="0"/>
-              <a:t>You may not modify</a:t>
-            </a:r>
-          </a:p>
-          <a:p>
-            <a:pPr lvl="1"/>
-            <a:r>
-              <a:rPr lang="en-US" dirty="0" smtClean="0"/>
-              <a:t>You don’t have the source</a:t>
-            </a:r>
-          </a:p>
-          <a:p>
-            <a:r>
-              <a:rPr lang="en-US" dirty="0" smtClean="0"/>
-              <a:t>Free software</a:t>
-            </a:r>
-          </a:p>
-          <a:p>
-            <a:pPr lvl="1"/>
-            <a:r>
-              <a:rPr lang="en-US" dirty="0" smtClean="0"/>
-              <a:t>You can modify if you allow redistribution</a:t>
-            </a:r>
-          </a:p>
-          <a:p>
-            <a:r>
-              <a:rPr lang="en-US" dirty="0" smtClean="0"/>
-              <a:t>Open source</a:t>
-            </a:r>
-          </a:p>
-          <a:p>
-            <a:r>
-              <a:rPr lang="en-US" dirty="0" smtClean="0"/>
-              <a:t>Free and Open Source Software</a:t>
+              <a:t>Very few solitary programmers</a:t>
+            </a:r>
+          </a:p>
+          <a:p>
+            <a:r>
+              <a:rPr lang="en-US" dirty="0" smtClean="0"/>
+              <a:t>Programs too big</a:t>
+            </a:r>
+          </a:p>
+          <a:p>
+            <a:r>
+              <a:rPr lang="en-US" dirty="0" smtClean="0"/>
+              <a:t>Teamwork has become a </a:t>
+            </a:r>
+            <a:r>
+              <a:rPr lang="en-US" b="1" dirty="0" smtClean="0"/>
+              <a:t>primary</a:t>
+            </a:r>
+            <a:r>
+              <a:rPr lang="en-US" dirty="0" smtClean="0"/>
+              <a:t> task</a:t>
+            </a:r>
+          </a:p>
+          <a:p>
+            <a:r>
+              <a:rPr lang="en-US" dirty="0" smtClean="0"/>
+              <a:t>Need excellent communication skills</a:t>
             </a:r>
             <a:endParaRPr lang="en-US" dirty="0"/>
           </a:p>
@@ -16700,9 +16766,9 @@
           <a:bodyPr/>
           <a:lstStyle/>
           <a:p>
-            <a:fld id="{6619BB61-29B3-1741-99E3-FEE7141957E5}" type="datetime1">
-              <a:rPr lang="en-US" smtClean="0"/>
-              <a:t>9/16/15</a:t>
+            <a:fld id="{EF3DD34D-3454-7F43-BC96-142603FFD52B}" type="datetime1">
+              <a:rPr lang="en-US" smtClean="0"/>
+              <a:t>9/25/16</a:t>
             </a:fld>
             <a:endParaRPr lang="en-US"/>
           </a:p>
@@ -16757,20 +16823,20 @@
     </p:spTree>
     <p:extLst>
       <p:ext uri="{BB962C8B-B14F-4D97-AF65-F5344CB8AC3E}">
-        <p14:creationId xmlns:p14="http://schemas.microsoft.com/office/powerpoint/2010/main" val="3652042437"/>
+        <p14:creationId xmlns:p14="http://schemas.microsoft.com/office/powerpoint/2010/main" val="3301862862"/>
       </p:ext>
     </p:extLst>
   </p:cSld>
   <p:clrMapOvr>
     <a:masterClrMapping/>
   </p:clrMapOvr>
-  <mc:AlternateContent xmlns:mc="http://schemas.openxmlformats.org/markup-compatibility/2006">
-    <mc:Choice xmlns:p14="http://schemas.microsoft.com/office/powerpoint/2010/main" Requires="p14">
+  <mc:AlternateContent xmlns:mc="http://schemas.openxmlformats.org/markup-compatibility/2006" xmlns:p14="http://schemas.microsoft.com/office/powerpoint/2010/main">
+    <mc:Choice Requires="p14">
       <p:transition spd="slow" p14:dur="1200">
         <p14:prism/>
       </p:transition>
     </mc:Choice>
-    <mc:Fallback>
+    <mc:Fallback xmlns="">
       <p:transition xmlns:p14="http://schemas.microsoft.com/office/powerpoint/2010/main" spd="slow">
         <p:fade/>
       </p:transition>
@@ -16812,9 +16878,10 @@
           <a:lstStyle/>
           <a:p>
             <a:r>
-              <a:rPr lang="en-US" dirty="0"/>
+              <a:rPr lang="en-US" dirty="0" smtClean="0"/>
               <a:t>Types of Software Licenses</a:t>
             </a:r>
+            <a:endParaRPr lang="en-US" dirty="0"/>
           </a:p>
         </p:txBody>
       </p:sp>
@@ -16835,31 +16902,46 @@
           <a:p>
             <a:r>
               <a:rPr lang="en-US" dirty="0" smtClean="0"/>
-              <a:t>83 types of FOSS licenses on </a:t>
-            </a:r>
-            <a:r>
-              <a:rPr lang="en-US" dirty="0" err="1" smtClean="0"/>
-              <a:t>sourceforge</a:t>
-            </a:r>
-            <a:endParaRPr lang="en-US" dirty="0" smtClean="0"/>
-          </a:p>
-          <a:p>
-            <a:r>
-              <a:rPr lang="en-US" dirty="0" smtClean="0"/>
-              <a:t>FOSS allows people to examine and contribute</a:t>
+              <a:t>Proprietary</a:t>
             </a:r>
           </a:p>
           <a:p>
             <a:pPr lvl="1"/>
             <a:r>
               <a:rPr lang="en-US" dirty="0" smtClean="0"/>
-              <a:t>Might help increase quality and security</a:t>
-            </a:r>
-          </a:p>
-          <a:p>
-            <a:r>
-              <a:rPr lang="en-US" dirty="0" smtClean="0"/>
-              <a:t>Level of support and activity varies</a:t>
+              <a:t>You may not modify</a:t>
+            </a:r>
+          </a:p>
+          <a:p>
+            <a:pPr lvl="1"/>
+            <a:r>
+              <a:rPr lang="en-US" dirty="0" smtClean="0"/>
+              <a:t>You don’t have the source</a:t>
+            </a:r>
+          </a:p>
+          <a:p>
+            <a:r>
+              <a:rPr lang="en-US" dirty="0" smtClean="0"/>
+              <a:t>Free software</a:t>
+            </a:r>
+          </a:p>
+          <a:p>
+            <a:pPr lvl="1"/>
+            <a:r>
+              <a:rPr lang="en-US" dirty="0" smtClean="0"/>
+              <a:t>You can modify if you allow redistribution</a:t>
+            </a:r>
+          </a:p>
+          <a:p>
+            <a:r>
+              <a:rPr lang="en-US" dirty="0" smtClean="0"/>
+              <a:t>Open source</a:t>
+            </a:r>
+          </a:p>
+          <a:p>
+            <a:r>
+              <a:rPr lang="en-US" dirty="0" smtClean="0"/>
+              <a:t>Free and Open Source Software</a:t>
             </a:r>
             <a:endParaRPr lang="en-US" dirty="0"/>
           </a:p>
@@ -16880,9 +16962,9 @@
           <a:bodyPr/>
           <a:lstStyle/>
           <a:p>
-            <a:fld id="{89A7A506-7DBA-AB4A-B0D4-22ED0A2830F9}" type="datetime1">
-              <a:rPr lang="en-US" smtClean="0"/>
-              <a:t>9/16/15</a:t>
+            <a:fld id="{6619BB61-29B3-1741-99E3-FEE7141957E5}" type="datetime1">
+              <a:rPr lang="en-US" smtClean="0"/>
+              <a:t>9/25/16</a:t>
             </a:fld>
             <a:endParaRPr lang="en-US"/>
           </a:p>
@@ -16937,20 +17019,20 @@
     </p:spTree>
     <p:extLst>
       <p:ext uri="{BB962C8B-B14F-4D97-AF65-F5344CB8AC3E}">
-        <p14:creationId xmlns:p14="http://schemas.microsoft.com/office/powerpoint/2010/main" val="1379728314"/>
+        <p14:creationId xmlns:p14="http://schemas.microsoft.com/office/powerpoint/2010/main" val="3652042437"/>
       </p:ext>
     </p:extLst>
   </p:cSld>
   <p:clrMapOvr>
     <a:masterClrMapping/>
   </p:clrMapOvr>
-  <mc:AlternateContent xmlns:mc="http://schemas.openxmlformats.org/markup-compatibility/2006">
-    <mc:Choice xmlns:p14="http://schemas.microsoft.com/office/powerpoint/2010/main" Requires="p14">
+  <mc:AlternateContent xmlns:mc="http://schemas.openxmlformats.org/markup-compatibility/2006" xmlns:p14="http://schemas.microsoft.com/office/powerpoint/2010/main">
+    <mc:Choice Requires="p14">
       <p:transition spd="slow" p14:dur="1200">
         <p14:prism/>
       </p:transition>
     </mc:Choice>
-    <mc:Fallback>
+    <mc:Fallback xmlns="">
       <p:transition xmlns:p14="http://schemas.microsoft.com/office/powerpoint/2010/main" spd="slow">
         <p:fade/>
       </p:transition>
@@ -16992,8 +17074,54 @@
           <a:lstStyle/>
           <a:p>
             <a:r>
-              <a:rPr lang="en-US" dirty="0" smtClean="0"/>
-              <a:t>Widely Used</a:t>
+              <a:rPr lang="en-US" dirty="0"/>
+              <a:t>Types of Software Licenses</a:t>
+            </a:r>
+          </a:p>
+        </p:txBody>
+      </p:sp>
+      <p:sp>
+        <p:nvSpPr>
+          <p:cNvPr id="3" name="Content Placeholder 2"/>
+          <p:cNvSpPr>
+            <a:spLocks noGrp="1"/>
+          </p:cNvSpPr>
+          <p:nvPr>
+            <p:ph idx="1"/>
+          </p:nvPr>
+        </p:nvSpPr>
+        <p:spPr/>
+        <p:txBody>
+          <a:bodyPr/>
+          <a:lstStyle/>
+          <a:p>
+            <a:r>
+              <a:rPr lang="en-US" dirty="0" smtClean="0"/>
+              <a:t>83 types of FOSS licenses on </a:t>
+            </a:r>
+            <a:r>
+              <a:rPr lang="en-US" dirty="0" err="1" smtClean="0"/>
+              <a:t>sourceforge</a:t>
+            </a:r>
+            <a:endParaRPr lang="en-US" dirty="0" smtClean="0"/>
+          </a:p>
+          <a:p>
+            <a:r>
+              <a:rPr lang="en-US" dirty="0" smtClean="0"/>
+              <a:t>FOSS allows people to examine and contribute</a:t>
+            </a:r>
+          </a:p>
+          <a:p>
+            <a:pPr lvl="1"/>
+            <a:r>
+              <a:rPr lang="en-US" dirty="0" smtClean="0"/>
+              <a:t>Might help increase quality and security</a:t>
+            </a:r>
+          </a:p>
+          <a:p>
+            <a:r>
+              <a:rPr lang="en-US" dirty="0" smtClean="0"/>
+              <a:t>Level of support and activity varies</a:t>
             </a:r>
             <a:endParaRPr lang="en-US" dirty="0"/>
           </a:p>
@@ -17001,128 +17129,7 @@
       </p:sp>
       <p:sp>
         <p:nvSpPr>
-          <p:cNvPr id="3" name="Content Placeholder 2"/>
-          <p:cNvSpPr>
-            <a:spLocks noGrp="1"/>
-          </p:cNvSpPr>
-          <p:nvPr>
-            <p:ph sz="half" idx="1"/>
-          </p:nvPr>
-        </p:nvSpPr>
-        <p:spPr/>
-        <p:txBody>
-          <a:bodyPr>
-            <a:normAutofit/>
-          </a:bodyPr>
-          <a:lstStyle/>
-          <a:p>
-            <a:r>
-              <a:rPr lang="en-US" dirty="0" smtClean="0"/>
-              <a:t>Apache</a:t>
-            </a:r>
-          </a:p>
-          <a:p>
-            <a:r>
-              <a:rPr lang="en-US" dirty="0" smtClean="0"/>
-              <a:t>Linux</a:t>
-            </a:r>
-          </a:p>
-          <a:p>
-            <a:r>
-              <a:rPr lang="en-US" dirty="0" err="1" smtClean="0"/>
-              <a:t>WordPress</a:t>
-            </a:r>
-            <a:endParaRPr lang="en-US" dirty="0" smtClean="0"/>
-          </a:p>
-          <a:p>
-            <a:r>
-              <a:rPr lang="en-US" dirty="0" smtClean="0"/>
-              <a:t>PHP</a:t>
-            </a:r>
-          </a:p>
-          <a:p>
-            <a:r>
-              <a:rPr lang="en-US" dirty="0" smtClean="0"/>
-              <a:t>Firefox</a:t>
-            </a:r>
-          </a:p>
-          <a:p>
-            <a:r>
-              <a:rPr lang="en-US" dirty="0" smtClean="0"/>
-              <a:t>Thunderbird</a:t>
-            </a:r>
-          </a:p>
-          <a:p>
-            <a:r>
-              <a:rPr lang="en-US" dirty="0" smtClean="0"/>
-              <a:t>Audacity</a:t>
-            </a:r>
-          </a:p>
-        </p:txBody>
-      </p:sp>
-      <p:sp>
-        <p:nvSpPr>
-          <p:cNvPr id="4" name="Content Placeholder 3"/>
-          <p:cNvSpPr>
-            <a:spLocks noGrp="1"/>
-          </p:cNvSpPr>
-          <p:nvPr>
-            <p:ph sz="half" idx="2"/>
-          </p:nvPr>
-        </p:nvSpPr>
-        <p:spPr/>
-        <p:txBody>
-          <a:bodyPr/>
-          <a:lstStyle/>
-          <a:p>
-            <a:r>
-              <a:rPr lang="en-US" dirty="0"/>
-              <a:t>GIMP</a:t>
-            </a:r>
-          </a:p>
-          <a:p>
-            <a:r>
-              <a:rPr lang="en-US" dirty="0"/>
-              <a:t>Eclipse</a:t>
-            </a:r>
-          </a:p>
-          <a:p>
-            <a:r>
-              <a:rPr lang="en-US" dirty="0"/>
-              <a:t>Notepad++</a:t>
-            </a:r>
-          </a:p>
-          <a:p>
-            <a:r>
-              <a:rPr lang="en-US" dirty="0"/>
-              <a:t>MySQL</a:t>
-            </a:r>
-          </a:p>
-          <a:p>
-            <a:r>
-              <a:rPr lang="en-US" dirty="0" err="1"/>
-              <a:t>Libre</a:t>
-            </a:r>
-            <a:r>
-              <a:rPr lang="en-US" dirty="0"/>
-              <a:t> </a:t>
-            </a:r>
-            <a:r>
-              <a:rPr lang="en-US" dirty="0" smtClean="0"/>
-              <a:t>Office</a:t>
-            </a:r>
-          </a:p>
-          <a:p>
-            <a:r>
-              <a:rPr lang="en-US" dirty="0" smtClean="0"/>
-              <a:t>Etc., etc.</a:t>
-            </a:r>
-          </a:p>
-        </p:txBody>
-      </p:sp>
-      <p:sp>
-        <p:nvSpPr>
-          <p:cNvPr id="5" name="Date Placeholder 4"/>
+          <p:cNvPr id="4" name="Date Placeholder 3"/>
           <p:cNvSpPr>
             <a:spLocks noGrp="1"/>
           </p:cNvSpPr>
@@ -17135,9 +17142,9 @@
           <a:bodyPr/>
           <a:lstStyle/>
           <a:p>
-            <a:fld id="{526B5CCA-7404-5048-B85E-9F8F28FBA8C4}" type="datetime1">
-              <a:rPr lang="en-US" smtClean="0"/>
-              <a:t>9/16/15</a:t>
+            <a:fld id="{89A7A506-7DBA-AB4A-B0D4-22ED0A2830F9}" type="datetime1">
+              <a:rPr lang="en-US" smtClean="0"/>
+              <a:t>9/25/16</a:t>
             </a:fld>
             <a:endParaRPr lang="en-US"/>
           </a:p>
@@ -17145,7 +17152,7 @@
       </p:sp>
       <p:sp>
         <p:nvSpPr>
-          <p:cNvPr id="6" name="Footer Placeholder 5"/>
+          <p:cNvPr id="5" name="Footer Placeholder 4"/>
           <p:cNvSpPr>
             <a:spLocks noGrp="1"/>
           </p:cNvSpPr>
@@ -17168,7 +17175,7 @@
       </p:sp>
       <p:sp>
         <p:nvSpPr>
-          <p:cNvPr id="7" name="Slide Number Placeholder 6"/>
+          <p:cNvPr id="6" name="Slide Number Placeholder 5"/>
           <p:cNvSpPr>
             <a:spLocks noGrp="1"/>
           </p:cNvSpPr>
@@ -17192,20 +17199,20 @@
     </p:spTree>
     <p:extLst>
       <p:ext uri="{BB962C8B-B14F-4D97-AF65-F5344CB8AC3E}">
-        <p14:creationId xmlns:p14="http://schemas.microsoft.com/office/powerpoint/2010/main" val="1510394549"/>
+        <p14:creationId xmlns:p14="http://schemas.microsoft.com/office/powerpoint/2010/main" val="1379728314"/>
       </p:ext>
     </p:extLst>
   </p:cSld>
   <p:clrMapOvr>
     <a:masterClrMapping/>
   </p:clrMapOvr>
-  <mc:AlternateContent xmlns:mc="http://schemas.openxmlformats.org/markup-compatibility/2006">
-    <mc:Choice xmlns:p14="http://schemas.microsoft.com/office/powerpoint/2010/main" Requires="p14">
+  <mc:AlternateContent xmlns:mc="http://schemas.openxmlformats.org/markup-compatibility/2006" xmlns:p14="http://schemas.microsoft.com/office/powerpoint/2010/main">
+    <mc:Choice Requires="p14">
       <p:transition spd="slow" p14:dur="1200">
         <p14:prism/>
       </p:transition>
     </mc:Choice>
-    <mc:Fallback>
+    <mc:Fallback xmlns="">
       <p:transition xmlns:p14="http://schemas.microsoft.com/office/powerpoint/2010/main" spd="slow">
         <p:fade/>
       </p:transition>
@@ -17233,6 +17240,261 @@
       </p:grpSpPr>
       <p:sp>
         <p:nvSpPr>
+          <p:cNvPr id="2" name="Title 1"/>
+          <p:cNvSpPr>
+            <a:spLocks noGrp="1"/>
+          </p:cNvSpPr>
+          <p:nvPr>
+            <p:ph type="title"/>
+          </p:nvPr>
+        </p:nvSpPr>
+        <p:spPr/>
+        <p:txBody>
+          <a:bodyPr/>
+          <a:lstStyle/>
+          <a:p>
+            <a:r>
+              <a:rPr lang="en-US" dirty="0" smtClean="0"/>
+              <a:t>Widely Used</a:t>
+            </a:r>
+            <a:endParaRPr lang="en-US" dirty="0"/>
+          </a:p>
+        </p:txBody>
+      </p:sp>
+      <p:sp>
+        <p:nvSpPr>
+          <p:cNvPr id="3" name="Content Placeholder 2"/>
+          <p:cNvSpPr>
+            <a:spLocks noGrp="1"/>
+          </p:cNvSpPr>
+          <p:nvPr>
+            <p:ph sz="half" idx="1"/>
+          </p:nvPr>
+        </p:nvSpPr>
+        <p:spPr/>
+        <p:txBody>
+          <a:bodyPr>
+            <a:normAutofit/>
+          </a:bodyPr>
+          <a:lstStyle/>
+          <a:p>
+            <a:r>
+              <a:rPr lang="en-US" dirty="0" smtClean="0"/>
+              <a:t>Apache</a:t>
+            </a:r>
+          </a:p>
+          <a:p>
+            <a:r>
+              <a:rPr lang="en-US" dirty="0" smtClean="0"/>
+              <a:t>Linux</a:t>
+            </a:r>
+          </a:p>
+          <a:p>
+            <a:r>
+              <a:rPr lang="en-US" dirty="0" err="1" smtClean="0"/>
+              <a:t>WordPress</a:t>
+            </a:r>
+            <a:endParaRPr lang="en-US" dirty="0" smtClean="0"/>
+          </a:p>
+          <a:p>
+            <a:r>
+              <a:rPr lang="en-US" dirty="0" smtClean="0"/>
+              <a:t>PHP</a:t>
+            </a:r>
+          </a:p>
+          <a:p>
+            <a:r>
+              <a:rPr lang="en-US" dirty="0" smtClean="0"/>
+              <a:t>Firefox</a:t>
+            </a:r>
+          </a:p>
+          <a:p>
+            <a:r>
+              <a:rPr lang="en-US" dirty="0" smtClean="0"/>
+              <a:t>Thunderbird</a:t>
+            </a:r>
+          </a:p>
+          <a:p>
+            <a:r>
+              <a:rPr lang="en-US" dirty="0" smtClean="0"/>
+              <a:t>Audacity</a:t>
+            </a:r>
+          </a:p>
+        </p:txBody>
+      </p:sp>
+      <p:sp>
+        <p:nvSpPr>
+          <p:cNvPr id="4" name="Content Placeholder 3"/>
+          <p:cNvSpPr>
+            <a:spLocks noGrp="1"/>
+          </p:cNvSpPr>
+          <p:nvPr>
+            <p:ph sz="half" idx="2"/>
+          </p:nvPr>
+        </p:nvSpPr>
+        <p:spPr/>
+        <p:txBody>
+          <a:bodyPr/>
+          <a:lstStyle/>
+          <a:p>
+            <a:r>
+              <a:rPr lang="en-US" dirty="0"/>
+              <a:t>GIMP</a:t>
+            </a:r>
+          </a:p>
+          <a:p>
+            <a:r>
+              <a:rPr lang="en-US" dirty="0"/>
+              <a:t>Eclipse</a:t>
+            </a:r>
+          </a:p>
+          <a:p>
+            <a:r>
+              <a:rPr lang="en-US" dirty="0"/>
+              <a:t>Notepad++</a:t>
+            </a:r>
+          </a:p>
+          <a:p>
+            <a:r>
+              <a:rPr lang="en-US" dirty="0"/>
+              <a:t>MySQL</a:t>
+            </a:r>
+          </a:p>
+          <a:p>
+            <a:r>
+              <a:rPr lang="en-US" dirty="0" err="1"/>
+              <a:t>Libre</a:t>
+            </a:r>
+            <a:r>
+              <a:rPr lang="en-US" dirty="0"/>
+              <a:t> </a:t>
+            </a:r>
+            <a:r>
+              <a:rPr lang="en-US" dirty="0" smtClean="0"/>
+              <a:t>Office</a:t>
+            </a:r>
+          </a:p>
+          <a:p>
+            <a:r>
+              <a:rPr lang="en-US" dirty="0" smtClean="0"/>
+              <a:t>Etc., etc.</a:t>
+            </a:r>
+          </a:p>
+        </p:txBody>
+      </p:sp>
+      <p:sp>
+        <p:nvSpPr>
+          <p:cNvPr id="5" name="Date Placeholder 4"/>
+          <p:cNvSpPr>
+            <a:spLocks noGrp="1"/>
+          </p:cNvSpPr>
+          <p:nvPr>
+            <p:ph type="dt" sz="half" idx="10"/>
+          </p:nvPr>
+        </p:nvSpPr>
+        <p:spPr/>
+        <p:txBody>
+          <a:bodyPr/>
+          <a:lstStyle/>
+          <a:p>
+            <a:fld id="{526B5CCA-7404-5048-B85E-9F8F28FBA8C4}" type="datetime1">
+              <a:rPr lang="en-US" smtClean="0"/>
+              <a:t>9/25/16</a:t>
+            </a:fld>
+            <a:endParaRPr lang="en-US"/>
+          </a:p>
+        </p:txBody>
+      </p:sp>
+      <p:sp>
+        <p:nvSpPr>
+          <p:cNvPr id="6" name="Footer Placeholder 5"/>
+          <p:cNvSpPr>
+            <a:spLocks noGrp="1"/>
+          </p:cNvSpPr>
+          <p:nvPr>
+            <p:ph type="ftr" sz="quarter" idx="11"/>
+          </p:nvPr>
+        </p:nvSpPr>
+        <p:spPr/>
+        <p:txBody>
+          <a:bodyPr/>
+          <a:lstStyle/>
+          <a:p>
+            <a:r>
+              <a:rPr lang="en-US" smtClean="0"/>
+              <a:t>© Steve Beaty and others</a:t>
+            </a:r>
+            <a:endParaRPr lang="en-US"/>
+          </a:p>
+        </p:txBody>
+      </p:sp>
+      <p:sp>
+        <p:nvSpPr>
+          <p:cNvPr id="7" name="Slide Number Placeholder 6"/>
+          <p:cNvSpPr>
+            <a:spLocks noGrp="1"/>
+          </p:cNvSpPr>
+          <p:nvPr>
+            <p:ph type="sldNum" sz="quarter" idx="12"/>
+          </p:nvPr>
+        </p:nvSpPr>
+        <p:spPr/>
+        <p:txBody>
+          <a:bodyPr/>
+          <a:lstStyle/>
+          <a:p>
+            <a:fld id="{41B4C9D8-61F2-104D-A787-545F90EAB0FE}" type="slidenum">
+              <a:rPr lang="en-US" smtClean="0"/>
+              <a:t>63</a:t>
+            </a:fld>
+            <a:endParaRPr lang="en-US"/>
+          </a:p>
+        </p:txBody>
+      </p:sp>
+    </p:spTree>
+    <p:extLst>
+      <p:ext uri="{BB962C8B-B14F-4D97-AF65-F5344CB8AC3E}">
+        <p14:creationId xmlns:p14="http://schemas.microsoft.com/office/powerpoint/2010/main" val="1510394549"/>
+      </p:ext>
+    </p:extLst>
+  </p:cSld>
+  <p:clrMapOvr>
+    <a:masterClrMapping/>
+  </p:clrMapOvr>
+  <mc:AlternateContent xmlns:mc="http://schemas.openxmlformats.org/markup-compatibility/2006" xmlns:p14="http://schemas.microsoft.com/office/powerpoint/2010/main">
+    <mc:Choice Requires="p14">
+      <p:transition spd="slow" p14:dur="1200">
+        <p14:prism/>
+      </p:transition>
+    </mc:Choice>
+    <mc:Fallback xmlns="">
+      <p:transition xmlns:p14="http://schemas.microsoft.com/office/powerpoint/2010/main" spd="slow">
+        <p:fade/>
+      </p:transition>
+    </mc:Fallback>
+  </mc:AlternateContent>
+</p:sld>
+</file>
+
+<file path=ppt/slides/slide64.xml><?xml version="1.0" encoding="utf-8"?>
+<p:sld xmlns:a="http://schemas.openxmlformats.org/drawingml/2006/main" xmlns:r="http://schemas.openxmlformats.org/officeDocument/2006/relationships" xmlns:p="http://schemas.openxmlformats.org/presentationml/2006/main">
+  <p:cSld>
+    <p:spTree>
+      <p:nvGrpSpPr>
+        <p:cNvPr id="1" name=""/>
+        <p:cNvGrpSpPr/>
+        <p:nvPr/>
+      </p:nvGrpSpPr>
+      <p:grpSpPr>
+        <a:xfrm>
+          <a:off x="0" y="0"/>
+          <a:ext cx="0" cy="0"/>
+          <a:chOff x="0" y="0"/>
+          <a:chExt cx="0" cy="0"/>
+        </a:xfrm>
+      </p:grpSpPr>
+      <p:sp>
+        <p:nvSpPr>
           <p:cNvPr id="8" name="Title 7"/>
           <p:cNvSpPr>
             <a:spLocks noGrp="1"/>
@@ -17306,7 +17568,7 @@
           <a:p>
             <a:fld id="{C5DAF1FD-2834-B645-BAF3-7F43B71D25D5}" type="datetime1">
               <a:rPr lang="en-US" smtClean="0"/>
-              <a:t>9/16/15</a:t>
+              <a:t>9/25/16</a:t>
             </a:fld>
             <a:endParaRPr lang="en-US"/>
           </a:p>
@@ -17352,7 +17614,7 @@
           <a:p>
             <a:fld id="{41B4C9D8-61F2-104D-A787-545F90EAB0FE}" type="slidenum">
               <a:rPr lang="en-US" smtClean="0"/>
-              <a:t>63</a:t>
+              <a:t>64</a:t>
             </a:fld>
             <a:endParaRPr lang="en-US"/>
           </a:p>
@@ -17476,7 +17738,7 @@
           <a:p>
             <a:fld id="{B4C73190-CBC6-9D40-A22B-6222CC923EB9}" type="datetime1">
               <a:rPr lang="en-US" smtClean="0"/>
-              <a:t>9/16/15</a:t>
+              <a:t>9/25/16</a:t>
             </a:fld>
             <a:endParaRPr lang="en-US"/>
           </a:p>
@@ -17515,13 +17777,13 @@
   <p:clrMapOvr>
     <a:masterClrMapping/>
   </p:clrMapOvr>
-  <mc:AlternateContent xmlns:mc="http://schemas.openxmlformats.org/markup-compatibility/2006">
-    <mc:Choice xmlns:p14="http://schemas.microsoft.com/office/powerpoint/2010/main" Requires="p14">
+  <mc:AlternateContent xmlns:mc="http://schemas.openxmlformats.org/markup-compatibility/2006" xmlns:p14="http://schemas.microsoft.com/office/powerpoint/2010/main">
+    <mc:Choice Requires="p14">
       <p:transition spd="slow" p14:dur="1200">
         <p14:prism/>
       </p:transition>
     </mc:Choice>
-    <mc:Fallback>
+    <mc:Fallback xmlns="">
       <p:transition xmlns:p14="http://schemas.microsoft.com/office/powerpoint/2010/main" spd="slow">
         <p:fade/>
       </p:transition>
@@ -17530,7 +17792,7 @@
   <p:timing>
     <p:tnLst>
       <p:par>
-        <p:cTn xmlns:p14="http://schemas.microsoft.com/office/powerpoint/2010/main" id="1" dur="indefinite" restart="never" nodeType="tmRoot"/>
+        <p:cTn id="1" dur="indefinite" restart="never" nodeType="tmRoot"/>
       </p:par>
     </p:tnLst>
   </p:timing>
@@ -17657,7 +17919,7 @@
           <a:p>
             <a:fld id="{C88C7F9A-66CD-5A41-9E56-CF5CC906B2D6}" type="datetime1">
               <a:rPr lang="en-US" smtClean="0"/>
-              <a:t>9/16/15</a:t>
+              <a:t>9/25/16</a:t>
             </a:fld>
             <a:endParaRPr lang="en-US"/>
           </a:p>
@@ -17696,13 +17958,13 @@
   <p:clrMapOvr>
     <a:masterClrMapping/>
   </p:clrMapOvr>
-  <mc:AlternateContent xmlns:mc="http://schemas.openxmlformats.org/markup-compatibility/2006">
-    <mc:Choice xmlns:p14="http://schemas.microsoft.com/office/powerpoint/2010/main" Requires="p14">
+  <mc:AlternateContent xmlns:mc="http://schemas.openxmlformats.org/markup-compatibility/2006" xmlns:p14="http://schemas.microsoft.com/office/powerpoint/2010/main">
+    <mc:Choice Requires="p14">
       <p:transition spd="slow" p14:dur="1200">
         <p14:prism/>
       </p:transition>
     </mc:Choice>
-    <mc:Fallback>
+    <mc:Fallback xmlns="">
       <p:transition xmlns:p14="http://schemas.microsoft.com/office/powerpoint/2010/main" spd="slow">
         <p:fade/>
       </p:transition>
@@ -17711,7 +17973,7 @@
   <p:timing>
     <p:tnLst>
       <p:par>
-        <p:cTn xmlns:p14="http://schemas.microsoft.com/office/powerpoint/2010/main" id="1" dur="indefinite" restart="never" nodeType="tmRoot"/>
+        <p:cTn id="1" dur="indefinite" restart="never" nodeType="tmRoot"/>
       </p:par>
     </p:tnLst>
   </p:timing>
@@ -17822,7 +18084,7 @@
           <a:p>
             <a:fld id="{DD89B9F1-551C-2945-A35F-78E73AF23BCB}" type="datetime1">
               <a:rPr lang="en-US" smtClean="0"/>
-              <a:t>9/16/15</a:t>
+              <a:t>9/25/16</a:t>
             </a:fld>
             <a:endParaRPr lang="en-US"/>
           </a:p>
@@ -17861,13 +18123,13 @@
   <p:clrMapOvr>
     <a:masterClrMapping/>
   </p:clrMapOvr>
-  <mc:AlternateContent xmlns:mc="http://schemas.openxmlformats.org/markup-compatibility/2006">
-    <mc:Choice xmlns:p14="http://schemas.microsoft.com/office/powerpoint/2010/main" Requires="p14">
+  <mc:AlternateContent xmlns:mc="http://schemas.openxmlformats.org/markup-compatibility/2006" xmlns:p14="http://schemas.microsoft.com/office/powerpoint/2010/main">
+    <mc:Choice Requires="p14">
       <p:transition spd="slow" p14:dur="1200">
         <p14:prism/>
       </p:transition>
     </mc:Choice>
-    <mc:Fallback>
+    <mc:Fallback xmlns="">
       <p:transition xmlns:p14="http://schemas.microsoft.com/office/powerpoint/2010/main" spd="slow">
         <p:fade/>
       </p:transition>
@@ -17876,7 +18138,7 @@
   <p:timing>
     <p:tnLst>
       <p:par>
-        <p:cTn xmlns:p14="http://schemas.microsoft.com/office/powerpoint/2010/main" id="1" dur="indefinite" restart="never" nodeType="tmRoot"/>
+        <p:cTn id="1" dur="indefinite" restart="never" nodeType="tmRoot"/>
       </p:par>
     </p:tnLst>
   </p:timing>

</xml_diff>